<commit_message>
New MTB template file with changing "year" in the left header from "2024" to "2025".
</commit_message>
<xml_diff>
--- a/In/Template/InPreD_MTB_template.pptx
+++ b/In/Template/InPreD_MTB_template.pptx
@@ -114,6 +114,22 @@
       </a:defRPr>
     </a:lvl9pPr>
   </p:defaultTextStyle>
+  <p:extLst>
+    <p:ext uri="{EFAFB233-063F-42B5-8137-9DF3F51BA10A}">
+      <p15:sldGuideLst xmlns:p15="http://schemas.microsoft.com/office/powerpoint/2012/main">
+        <p15:guide id="1" orient="horz" pos="1563" userDrawn="1">
+          <p15:clr>
+            <a:srgbClr val="A4A3A4"/>
+          </p15:clr>
+        </p15:guide>
+        <p15:guide id="2" pos="2878" userDrawn="1">
+          <p15:clr>
+            <a:srgbClr val="A4A3A4"/>
+          </p15:clr>
+        </p15:guide>
+      </p15:sldGuideLst>
+    </p:ext>
+  </p:extLst>
 </p:presentation>
 </file>
 
@@ -3219,7 +3235,7 @@
         <a:spcBef>
           <a:spcPct val="20000"/>
         </a:spcBef>
-        <a:buFont typeface="Arial" panose="020B0604020202020204" pitchFamily="34" charset="0"/>
+        <a:buFont typeface="Arial" panose="020B0604020202090204" pitchFamily="34" charset="0"/>
         <a:buChar char="•"/>
         <a:defRPr sz="3200" kern="1200">
           <a:solidFill>
@@ -3234,7 +3250,7 @@
         <a:spcBef>
           <a:spcPct val="20000"/>
         </a:spcBef>
-        <a:buFont typeface="Arial" panose="020B0604020202020204" pitchFamily="34" charset="0"/>
+        <a:buFont typeface="Arial" panose="020B0604020202090204" pitchFamily="34" charset="0"/>
         <a:buChar char="–"/>
         <a:defRPr sz="2800" kern="1200">
           <a:solidFill>
@@ -3249,7 +3265,7 @@
         <a:spcBef>
           <a:spcPct val="20000"/>
         </a:spcBef>
-        <a:buFont typeface="Arial" panose="020B0604020202020204" pitchFamily="34" charset="0"/>
+        <a:buFont typeface="Arial" panose="020B0604020202090204" pitchFamily="34" charset="0"/>
         <a:buChar char="•"/>
         <a:defRPr sz="2400" kern="1200">
           <a:solidFill>
@@ -3264,7 +3280,7 @@
         <a:spcBef>
           <a:spcPct val="20000"/>
         </a:spcBef>
-        <a:buFont typeface="Arial" panose="020B0604020202020204" pitchFamily="34" charset="0"/>
+        <a:buFont typeface="Arial" panose="020B0604020202090204" pitchFamily="34" charset="0"/>
         <a:buChar char="–"/>
         <a:defRPr sz="2000" kern="1200">
           <a:solidFill>
@@ -3279,7 +3295,7 @@
         <a:spcBef>
           <a:spcPct val="20000"/>
         </a:spcBef>
-        <a:buFont typeface="Arial" panose="020B0604020202020204" pitchFamily="34" charset="0"/>
+        <a:buFont typeface="Arial" panose="020B0604020202090204" pitchFamily="34" charset="0"/>
         <a:buChar char="»"/>
         <a:defRPr sz="2000" kern="1200">
           <a:solidFill>
@@ -3294,7 +3310,7 @@
         <a:spcBef>
           <a:spcPct val="20000"/>
         </a:spcBef>
-        <a:buFont typeface="Arial" panose="020B0604020202020204" pitchFamily="34" charset="0"/>
+        <a:buFont typeface="Arial" panose="020B0604020202090204" pitchFamily="34" charset="0"/>
         <a:buChar char="•"/>
         <a:defRPr sz="2000" kern="1200">
           <a:solidFill>
@@ -3309,7 +3325,7 @@
         <a:spcBef>
           <a:spcPct val="20000"/>
         </a:spcBef>
-        <a:buFont typeface="Arial" panose="020B0604020202020204" pitchFamily="34" charset="0"/>
+        <a:buFont typeface="Arial" panose="020B0604020202090204" pitchFamily="34" charset="0"/>
         <a:buChar char="•"/>
         <a:defRPr sz="2000" kern="1200">
           <a:solidFill>
@@ -3324,7 +3340,7 @@
         <a:spcBef>
           <a:spcPct val="20000"/>
         </a:spcBef>
-        <a:buFont typeface="Arial" panose="020B0604020202020204" pitchFamily="34" charset="0"/>
+        <a:buFont typeface="Arial" panose="020B0604020202090204" pitchFamily="34" charset="0"/>
         <a:buChar char="•"/>
         <a:defRPr sz="2000" kern="1200">
           <a:solidFill>
@@ -3339,7 +3355,7 @@
         <a:spcBef>
           <a:spcPct val="20000"/>
         </a:spcBef>
-        <a:buFont typeface="Arial" panose="020B0604020202020204" pitchFamily="34" charset="0"/>
+        <a:buFont typeface="Arial" panose="020B0604020202090204" pitchFamily="34" charset="0"/>
         <a:buChar char="•"/>
         <a:defRPr sz="2000" kern="1200">
           <a:solidFill>
@@ -3840,8 +3856,8 @@
                         <a:t>indels</a:t>
                       </a:r>
                       <a:endParaRPr lang="en-US" sz="700" b="1" dirty="0">
-                        <a:latin typeface="Times New Roman" panose="02020603050405020304"/>
-                        <a:ea typeface="Times New Roman" panose="02020603050405020304"/>
+                        <a:latin typeface="Times New Roman" panose="02020503050405090304"/>
+                        <a:ea typeface="Times New Roman" panose="02020503050405090304"/>
                       </a:endParaRPr>
                     </a:p>
                   </a:txBody>
@@ -3975,8 +3991,8 @@
                         <a:solidFill>
                           <a:schemeClr val="tx1"/>
                         </a:solidFill>
-                        <a:latin typeface="Times New Roman" panose="02020603050405020304"/>
-                        <a:ea typeface="Times New Roman" panose="02020603050405020304"/>
+                        <a:latin typeface="Times New Roman" panose="02020503050405090304"/>
+                        <a:ea typeface="Times New Roman" panose="02020503050405090304"/>
                       </a:endParaRPr>
                     </a:p>
                   </a:txBody>
@@ -4011,8 +4027,8 @@
                         <a:solidFill>
                           <a:schemeClr val="tx1"/>
                         </a:solidFill>
-                        <a:latin typeface="Times New Roman" panose="02020603050405020304"/>
-                        <a:ea typeface="Times New Roman" panose="02020603050405020304"/>
+                        <a:latin typeface="Times New Roman" panose="02020503050405090304"/>
+                        <a:ea typeface="Times New Roman" panose="02020503050405090304"/>
                       </a:endParaRPr>
                     </a:p>
                     <a:p>
@@ -4036,8 +4052,8 @@
                         <a:solidFill>
                           <a:schemeClr val="tx1"/>
                         </a:solidFill>
-                        <a:latin typeface="Times New Roman" panose="02020603050405020304"/>
-                        <a:ea typeface="Times New Roman" panose="02020603050405020304"/>
+                        <a:latin typeface="Times New Roman" panose="02020503050405090304"/>
+                        <a:ea typeface="Times New Roman" panose="02020503050405090304"/>
                       </a:endParaRPr>
                     </a:p>
                     <a:p>
@@ -4061,8 +4077,8 @@
                         <a:solidFill>
                           <a:schemeClr val="tx1"/>
                         </a:solidFill>
-                        <a:latin typeface="Times New Roman" panose="02020603050405020304"/>
-                        <a:ea typeface="Times New Roman" panose="02020603050405020304"/>
+                        <a:latin typeface="Times New Roman" panose="02020503050405090304"/>
+                        <a:ea typeface="Times New Roman" panose="02020503050405090304"/>
                       </a:endParaRPr>
                     </a:p>
                   </a:txBody>
@@ -4090,8 +4106,8 @@
                         <a:t>Copy number variants</a:t>
                       </a:r>
                       <a:endParaRPr lang="en-US" sz="700" b="1" dirty="0">
-                        <a:latin typeface="Times New Roman" panose="02020603050405020304"/>
-                        <a:ea typeface="Times New Roman" panose="02020603050405020304"/>
+                        <a:latin typeface="Times New Roman" panose="02020503050405090304"/>
+                        <a:ea typeface="Times New Roman" panose="02020503050405090304"/>
                       </a:endParaRPr>
                     </a:p>
                   </a:txBody>
@@ -4119,7 +4135,7 @@
                       </a:pPr>
                       <a:endParaRPr lang="en-US" sz="700" dirty="0">
                         <a:latin typeface="+mn-lt"/>
-                        <a:ea typeface="Times New Roman" panose="02020603050405020304"/>
+                        <a:ea typeface="Times New Roman" panose="02020503050405090304"/>
                       </a:endParaRPr>
                     </a:p>
                   </a:txBody>
@@ -4147,20 +4163,20 @@
                       <a:r>
                         <a:rPr lang="en-US" sz="700" b="1" dirty="0" smtClean="0">
                           <a:latin typeface="+mn-lt"/>
-                          <a:ea typeface="Times New Roman" panose="02020603050405020304"/>
+                          <a:ea typeface="Times New Roman" panose="02020503050405090304"/>
                         </a:rPr>
                         <a:t>Gene</a:t>
                       </a:r>
                       <a:r>
                         <a:rPr lang="en-US" sz="700" b="1" baseline="0" dirty="0" smtClean="0">
                           <a:latin typeface="+mn-lt"/>
-                          <a:ea typeface="Times New Roman" panose="02020603050405020304"/>
+                          <a:ea typeface="Times New Roman" panose="02020503050405090304"/>
                         </a:rPr>
                         <a:t> fusions</a:t>
                       </a:r>
                       <a:endParaRPr lang="en-US" sz="700" b="1" baseline="0" dirty="0" smtClean="0">
                         <a:latin typeface="+mn-lt"/>
-                        <a:ea typeface="Times New Roman" panose="02020603050405020304"/>
+                        <a:ea typeface="Times New Roman" panose="02020503050405090304"/>
                       </a:endParaRPr>
                     </a:p>
                     <a:p>
@@ -4175,7 +4191,7 @@
                       <a:r>
                         <a:rPr lang="en-US" sz="700" b="0" baseline="0" dirty="0" smtClean="0">
                           <a:latin typeface="+mn-lt"/>
-                          <a:ea typeface="Times New Roman" panose="02020603050405020304"/>
+                          <a:ea typeface="Times New Roman" panose="02020503050405090304"/>
                         </a:rPr>
                         <a:t> </a:t>
                       </a:r>
@@ -4188,7 +4204,7 @@
                             </a:schemeClr>
                           </a:solidFill>
                           <a:latin typeface="+mn-lt"/>
-                          <a:ea typeface="Times New Roman" panose="02020603050405020304"/>
+                          <a:ea typeface="Times New Roman" panose="02020503050405090304"/>
                         </a:rPr>
                         <a:t>RNA</a:t>
                       </a:r>
@@ -4200,7 +4216,7 @@
                           </a:schemeClr>
                         </a:solidFill>
                         <a:latin typeface="+mn-lt"/>
-                        <a:ea typeface="Times New Roman" panose="02020603050405020304"/>
+                        <a:ea typeface="Times New Roman" panose="02020503050405090304"/>
                       </a:endParaRPr>
                     </a:p>
                   </a:txBody>
@@ -4228,7 +4244,7 @@
                       </a:pPr>
                       <a:endParaRPr lang="en-US" sz="700" dirty="0">
                         <a:latin typeface="+mn-lt"/>
-                        <a:ea typeface="Times New Roman" panose="02020603050405020304"/>
+                        <a:ea typeface="Times New Roman" panose="02020503050405090304"/>
                       </a:endParaRPr>
                     </a:p>
                   </a:txBody>
@@ -4292,8 +4308,8 @@
                         <a:t>TMB</a:t>
                       </a:r>
                       <a:endParaRPr lang="en-US" sz="1000" b="0" dirty="0">
-                        <a:latin typeface="Times New Roman" panose="02020603050405020304"/>
-                        <a:ea typeface="Times New Roman" panose="02020603050405020304"/>
+                        <a:latin typeface="Times New Roman" panose="02020503050405090304"/>
+                        <a:ea typeface="Times New Roman" panose="02020503050405090304"/>
                       </a:endParaRPr>
                     </a:p>
                   </a:txBody>
@@ -4328,8 +4344,8 @@
                         <a:defRPr/>
                       </a:pPr>
                       <a:endParaRPr lang="en-US" sz="600" dirty="0" smtClean="0">
-                        <a:latin typeface="Times New Roman" panose="02020603050405020304"/>
-                        <a:ea typeface="Times New Roman" panose="02020603050405020304"/>
+                        <a:latin typeface="Times New Roman" panose="02020503050405090304"/>
+                        <a:ea typeface="Times New Roman" panose="02020503050405090304"/>
                       </a:endParaRPr>
                     </a:p>
                     <a:p>
@@ -4350,8 +4366,8 @@
                         <a:defRPr/>
                       </a:pPr>
                       <a:endParaRPr lang="en-US" sz="600" dirty="0" smtClean="0">
-                        <a:latin typeface="Times New Roman" panose="02020603050405020304"/>
-                        <a:ea typeface="Times New Roman" panose="02020603050405020304"/>
+                        <a:latin typeface="Times New Roman" panose="02020503050405090304"/>
+                        <a:ea typeface="Times New Roman" panose="02020503050405090304"/>
                       </a:endParaRPr>
                     </a:p>
                     <a:p>
@@ -4372,8 +4388,8 @@
                         <a:defRPr/>
                       </a:pPr>
                       <a:endParaRPr lang="en-US" sz="600" dirty="0" smtClean="0">
-                        <a:latin typeface="Times New Roman" panose="02020603050405020304"/>
-                        <a:ea typeface="Times New Roman" panose="02020603050405020304"/>
+                        <a:latin typeface="Times New Roman" panose="02020503050405090304"/>
+                        <a:ea typeface="Times New Roman" panose="02020503050405090304"/>
                       </a:endParaRPr>
                     </a:p>
                     <a:p>
@@ -4394,8 +4410,8 @@
                         <a:defRPr/>
                       </a:pPr>
                       <a:endParaRPr lang="en-US" sz="600" dirty="0" smtClean="0">
-                        <a:latin typeface="Times New Roman" panose="02020603050405020304"/>
-                        <a:ea typeface="Times New Roman" panose="02020603050405020304"/>
+                        <a:latin typeface="Times New Roman" panose="02020503050405090304"/>
+                        <a:ea typeface="Times New Roman" panose="02020503050405090304"/>
                       </a:endParaRPr>
                     </a:p>
                   </a:txBody>
@@ -4458,8 +4474,8 @@
                         <a:t>status</a:t>
                       </a:r>
                       <a:endParaRPr lang="en-US" sz="800" b="0" dirty="0" smtClean="0">
-                        <a:latin typeface="Times New Roman" panose="02020603050405020304"/>
-                        <a:ea typeface="Times New Roman" panose="02020603050405020304"/>
+                        <a:latin typeface="Times New Roman" panose="02020503050405090304"/>
+                        <a:ea typeface="Times New Roman" panose="02020503050405090304"/>
                       </a:endParaRPr>
                     </a:p>
                   </a:txBody>
@@ -4486,8 +4502,8 @@
                         </a:spcAft>
                       </a:pPr>
                       <a:endParaRPr lang="en-US" sz="800" dirty="0">
-                        <a:latin typeface="Times New Roman" panose="02020603050405020304"/>
-                        <a:ea typeface="Times New Roman" panose="02020603050405020304"/>
+                        <a:latin typeface="Times New Roman" panose="02020503050405090304"/>
+                        <a:ea typeface="Times New Roman" panose="02020503050405090304"/>
                       </a:endParaRPr>
                     </a:p>
                   </a:txBody>
@@ -4913,7 +4929,7 @@
               <a:t>MTB</a:t>
             </a:r>
             <a:endParaRPr lang="en-US" sz="1600" b="0" strike="noStrike" spc="-1">
-              <a:latin typeface="Arial" panose="020B0604020202020204"/>
+              <a:latin typeface="Arial" panose="020B0604020202090204"/>
             </a:endParaRPr>
           </a:p>
           <a:p>
@@ -4932,7 +4948,7 @@
               <a:t>Report </a:t>
             </a:r>
             <a:endParaRPr lang="en-US" sz="1000" b="0" strike="noStrike" spc="-1">
-              <a:latin typeface="Arial" panose="020B0604020202020204"/>
+              <a:latin typeface="Arial" panose="020B0604020202090204"/>
             </a:endParaRPr>
           </a:p>
         </p:txBody>
@@ -4998,7 +5014,7 @@
               <a:t> </a:t>
             </a:r>
             <a:endParaRPr lang="en-US" sz="1400" b="0" strike="noStrike" spc="-1">
-              <a:latin typeface="Arial" panose="020B0604020202020204"/>
+              <a:latin typeface="Arial" panose="020B0604020202090204"/>
             </a:endParaRPr>
           </a:p>
         </p:txBody>
@@ -5055,7 +5071,7 @@
               <a:t>MDT</a:t>
             </a:r>
             <a:endParaRPr lang="en-US" sz="1600" b="0" strike="noStrike" spc="-1" dirty="0">
-              <a:latin typeface="Arial" panose="020B0604020202020204"/>
+              <a:latin typeface="Arial" panose="020B0604020202090204"/>
             </a:endParaRPr>
           </a:p>
           <a:p>
@@ -5074,7 +5090,7 @@
               <a:t>Report </a:t>
             </a:r>
             <a:endParaRPr lang="en-US" sz="1000" b="0" strike="noStrike" spc="-1" dirty="0">
-              <a:latin typeface="Arial" panose="020B0604020202020204"/>
+              <a:latin typeface="Arial" panose="020B0604020202090204"/>
             </a:endParaRPr>
           </a:p>
         </p:txBody>
@@ -5140,7 +5156,7 @@
               <a:t> </a:t>
             </a:r>
             <a:endParaRPr lang="en-US" sz="1000" b="0" strike="noStrike" spc="-1" dirty="0">
-              <a:latin typeface="Arial" panose="020B0604020202020204"/>
+              <a:latin typeface="Arial" panose="020B0604020202090204"/>
             </a:endParaRPr>
           </a:p>
           <a:p>
@@ -5159,7 +5175,7 @@
               <a:t>XXX</a:t>
             </a:r>
             <a:endParaRPr lang="en-US" sz="1200" b="0" strike="noStrike" spc="-1" dirty="0">
-              <a:latin typeface="Arial" panose="020B0604020202020204"/>
+              <a:latin typeface="Arial" panose="020B0604020202090204"/>
             </a:endParaRPr>
           </a:p>
           <a:p>
@@ -5178,7 +5194,7 @@
               <a:t>2022</a:t>
             </a:r>
             <a:endParaRPr lang="en-US" sz="800" b="0" strike="noStrike" spc="-1" dirty="0">
-              <a:latin typeface="Arial" panose="020B0604020202020204"/>
+              <a:latin typeface="Arial" panose="020B0604020202090204"/>
             </a:endParaRPr>
           </a:p>
         </p:txBody>
@@ -5892,7 +5908,7 @@
               <a:t> </a:t>
             </a:r>
             <a:endParaRPr lang="en-US" sz="1400" b="0" strike="noStrike" spc="-1" dirty="0">
-              <a:latin typeface="Arial" panose="020B0604020202020204"/>
+              <a:latin typeface="Arial" panose="020B0604020202090204"/>
             </a:endParaRPr>
           </a:p>
         </p:txBody>
@@ -5958,7 +5974,7 @@
               <a:t> </a:t>
             </a:r>
             <a:endParaRPr lang="en-US" sz="1400" b="0" strike="noStrike" spc="-1" dirty="0">
-              <a:latin typeface="Arial" panose="020B0604020202020204"/>
+              <a:latin typeface="Arial" panose="020B0604020202090204"/>
             </a:endParaRPr>
           </a:p>
         </p:txBody>
@@ -6024,7 +6040,7 @@
               <a:t> </a:t>
             </a:r>
             <a:endParaRPr lang="en-US" sz="1400" b="0" strike="noStrike" spc="-1">
-              <a:latin typeface="Arial" panose="020B0604020202020204"/>
+              <a:latin typeface="Arial" panose="020B0604020202090204"/>
             </a:endParaRPr>
           </a:p>
         </p:txBody>
@@ -6115,7 +6131,7 @@
               <a:t>xx</a:t>
             </a:r>
             <a:endParaRPr lang="en-US" sz="1800" b="0" strike="noStrike" spc="-1" dirty="0">
-              <a:latin typeface="Arial" panose="020B0604020202020204"/>
+              <a:latin typeface="Arial" panose="020B0604020202090204"/>
             </a:endParaRPr>
           </a:p>
           <a:p>
@@ -6134,7 +6150,7 @@
               <a:t>XXX</a:t>
             </a:r>
             <a:endParaRPr lang="en-US" sz="1200" b="0" strike="noStrike" spc="-1" dirty="0">
-              <a:latin typeface="Arial" panose="020B0604020202020204"/>
+              <a:latin typeface="Arial" panose="020B0604020202090204"/>
             </a:endParaRPr>
           </a:p>
           <a:p>
@@ -6159,7 +6175,7 @@
                 </a:solidFill>
                 <a:latin typeface="Calibri"/>
               </a:rPr>
-              <a:t>4</a:t>
+              <a:t>5</a:t>
             </a:r>
             <a:endParaRPr lang="nb-NO" altLang="en-US" sz="800" b="0" strike="noStrike" spc="-1" dirty="0" smtClean="0">
               <a:solidFill>
@@ -6222,7 +6238,7 @@
               <a:t>MDT</a:t>
             </a:r>
             <a:endParaRPr lang="en-US" sz="1400" b="0" strike="noStrike" spc="-1" dirty="0">
-              <a:latin typeface="Arial" panose="020B0604020202020204"/>
+              <a:latin typeface="Arial" panose="020B0604020202090204"/>
             </a:endParaRPr>
           </a:p>
         </p:txBody>
@@ -6368,7 +6384,7 @@
               <a:t>Patient</a:t>
             </a:r>
             <a:endParaRPr lang="en-US" sz="1000" b="0" strike="noStrike" spc="-1">
-              <a:latin typeface="Arial" panose="020B0604020202020204"/>
+              <a:latin typeface="Arial" panose="020B0604020202090204"/>
             </a:endParaRPr>
           </a:p>
         </p:txBody>
@@ -6697,7 +6713,7 @@
               <a:t>Y of D: </a:t>
             </a:r>
             <a:endParaRPr lang="en-US" sz="800" b="0" strike="noStrike" spc="-1">
-              <a:latin typeface="Arial" panose="020B0604020202020204"/>
+              <a:latin typeface="Arial" panose="020B0604020202090204"/>
             </a:endParaRPr>
           </a:p>
         </p:txBody>
@@ -6803,7 +6819,7 @@
               <a:t>Bio-material</a:t>
             </a:r>
             <a:endParaRPr lang="en-US" sz="1000" b="0" strike="noStrike" spc="-1">
-              <a:latin typeface="Arial" panose="020B0604020202020204"/>
+              <a:latin typeface="Arial" panose="020B0604020202090204"/>
             </a:endParaRPr>
           </a:p>
         </p:txBody>
@@ -6909,7 +6925,7 @@
               <a:t>Tumor content</a:t>
             </a:r>
             <a:endParaRPr lang="en-US" sz="1000" b="0" strike="noStrike" spc="-1" dirty="0">
-              <a:latin typeface="Arial" panose="020B0604020202020204"/>
+              <a:latin typeface="Arial" panose="020B0604020202090204"/>
             </a:endParaRPr>
           </a:p>
         </p:txBody>
@@ -7015,7 +7031,7 @@
               <a:solidFill>
                 <a:schemeClr val="bg1"/>
               </a:solidFill>
-              <a:latin typeface="Arial" panose="020B0604020202020204"/>
+              <a:latin typeface="Arial" panose="020B0604020202090204"/>
             </a:endParaRPr>
           </a:p>
           <a:p>
@@ -7037,7 +7053,7 @@
               <a:solidFill>
                 <a:schemeClr val="bg1"/>
               </a:solidFill>
-              <a:latin typeface="Arial" panose="020B0604020202020204"/>
+              <a:latin typeface="Arial" panose="020B0604020202090204"/>
             </a:endParaRPr>
           </a:p>
         </p:txBody>
@@ -7381,7 +7397,7 @@
               <a:t>MTB</a:t>
             </a:r>
             <a:endParaRPr lang="en-US" sz="1600" b="0" strike="noStrike" spc="-1">
-              <a:latin typeface="Arial" panose="020B0604020202020204"/>
+              <a:latin typeface="Arial" panose="020B0604020202090204"/>
             </a:endParaRPr>
           </a:p>
           <a:p>
@@ -7400,7 +7416,7 @@
               <a:t>Report </a:t>
             </a:r>
             <a:endParaRPr lang="en-US" sz="1000" b="0" strike="noStrike" spc="-1">
-              <a:latin typeface="Arial" panose="020B0604020202020204"/>
+              <a:latin typeface="Arial" panose="020B0604020202090204"/>
             </a:endParaRPr>
           </a:p>
         </p:txBody>
@@ -7457,7 +7473,7 @@
               <a:t>MDT</a:t>
             </a:r>
             <a:endParaRPr lang="en-US" sz="1600" b="0" strike="noStrike" spc="-1" dirty="0">
-              <a:latin typeface="Arial" panose="020B0604020202020204"/>
+              <a:latin typeface="Arial" panose="020B0604020202090204"/>
             </a:endParaRPr>
           </a:p>
           <a:p>
@@ -7476,7 +7492,7 @@
               <a:t>Report </a:t>
             </a:r>
             <a:endParaRPr lang="en-US" sz="1000" b="0" strike="noStrike" spc="-1" dirty="0">
-              <a:latin typeface="Arial" panose="020B0604020202020204"/>
+              <a:latin typeface="Arial" panose="020B0604020202090204"/>
             </a:endParaRPr>
           </a:p>
         </p:txBody>
@@ -7533,7 +7549,7 @@
               <a:t>CLINICAL CASE:</a:t>
             </a:r>
             <a:endParaRPr lang="en-US" sz="1100" b="0" strike="noStrike" spc="-1" dirty="0">
-              <a:latin typeface="Arial" panose="020B0604020202020204"/>
+              <a:latin typeface="Arial" panose="020B0604020202090204"/>
             </a:endParaRPr>
           </a:p>
           <a:p>
@@ -7543,7 +7559,7 @@
               </a:lnSpc>
             </a:pPr>
             <a:endParaRPr lang="en-US" sz="1100" b="0" strike="noStrike" spc="-1" dirty="0">
-              <a:latin typeface="Arial" panose="020B0604020202020204"/>
+              <a:latin typeface="Arial" panose="020B0604020202090204"/>
             </a:endParaRPr>
           </a:p>
           <a:p>
@@ -7553,7 +7569,7 @@
               </a:lnSpc>
             </a:pPr>
             <a:endParaRPr lang="en-US" sz="1100" b="0" strike="noStrike" spc="-1" dirty="0">
-              <a:latin typeface="Arial" panose="020B0604020202020204"/>
+              <a:latin typeface="Arial" panose="020B0604020202090204"/>
             </a:endParaRPr>
           </a:p>
           <a:p>
@@ -7572,7 +7588,7 @@
               <a:t> </a:t>
             </a:r>
             <a:endParaRPr lang="en-US" sz="1100" b="0" strike="noStrike" spc="-1" dirty="0">
-              <a:latin typeface="Arial" panose="020B0604020202020204"/>
+              <a:latin typeface="Arial" panose="020B0604020202090204"/>
             </a:endParaRPr>
           </a:p>
         </p:txBody>
@@ -7620,7 +7636,7 @@
               </a:lnSpc>
             </a:pPr>
             <a:endParaRPr lang="en-US" sz="1800" b="0" strike="noStrike" spc="-1" dirty="0">
-              <a:latin typeface="Arial" panose="020B0604020202020204"/>
+              <a:latin typeface="Arial" panose="020B0604020202090204"/>
             </a:endParaRPr>
           </a:p>
           <a:p>
@@ -7781,7 +7797,7 @@
               <a:t> </a:t>
             </a:r>
             <a:endParaRPr lang="en-US" sz="1400" b="0" strike="noStrike" spc="-1" dirty="0">
-              <a:latin typeface="Arial" panose="020B0604020202020204"/>
+              <a:latin typeface="Arial" panose="020B0604020202090204"/>
             </a:endParaRPr>
           </a:p>
         </p:txBody>
@@ -7847,7 +7863,7 @@
               <a:t> </a:t>
             </a:r>
             <a:endParaRPr lang="en-US" sz="1400" b="0" strike="noStrike" spc="-1" dirty="0">
-              <a:latin typeface="Arial" panose="020B0604020202020204"/>
+              <a:latin typeface="Arial" panose="020B0604020202090204"/>
             </a:endParaRPr>
           </a:p>
         </p:txBody>
@@ -7913,7 +7929,7 @@
               <a:t> </a:t>
             </a:r>
             <a:endParaRPr lang="en-US" sz="1400" b="0" strike="noStrike" spc="-1">
-              <a:latin typeface="Arial" panose="020B0604020202020204"/>
+              <a:latin typeface="Arial" panose="020B0604020202090204"/>
             </a:endParaRPr>
           </a:p>
         </p:txBody>
@@ -8121,7 +8137,7 @@
               <a:t>xx</a:t>
             </a:r>
             <a:endParaRPr lang="en-US" sz="1800" b="0" strike="noStrike" spc="-1" dirty="0">
-              <a:latin typeface="Arial" panose="020B0604020202020204"/>
+              <a:latin typeface="Arial" panose="020B0604020202090204"/>
             </a:endParaRPr>
           </a:p>
           <a:p>
@@ -8140,7 +8156,7 @@
               <a:t>XXX</a:t>
             </a:r>
             <a:endParaRPr lang="en-US" sz="1200" b="0" strike="noStrike" spc="-1" dirty="0">
-              <a:latin typeface="Arial" panose="020B0604020202020204"/>
+              <a:latin typeface="Arial" panose="020B0604020202090204"/>
             </a:endParaRPr>
           </a:p>
           <a:p>
@@ -8165,7 +8181,7 @@
                 </a:solidFill>
                 <a:latin typeface="Calibri"/>
               </a:rPr>
-              <a:t>4</a:t>
+              <a:t>5</a:t>
             </a:r>
             <a:endParaRPr lang="nb-NO" altLang="en-US" sz="800" b="0" strike="noStrike" spc="-1" dirty="0" smtClean="0">
               <a:solidFill>
@@ -8228,7 +8244,7 @@
               <a:t>MDT</a:t>
             </a:r>
             <a:endParaRPr lang="en-US" sz="1400" b="0" strike="noStrike" spc="-1" dirty="0">
-              <a:latin typeface="Arial" panose="020B0604020202020204"/>
+              <a:latin typeface="Arial" panose="020B0604020202090204"/>
             </a:endParaRPr>
           </a:p>
         </p:txBody>
@@ -8352,7 +8368,7 @@
               <a:t>site</a:t>
             </a:r>
             <a:endParaRPr lang="en-US" sz="700" b="0" strike="noStrike" spc="-1" dirty="0">
-              <a:latin typeface="Arial" panose="020B0604020202020204"/>
+              <a:latin typeface="Arial" panose="020B0604020202090204"/>
             </a:endParaRPr>
           </a:p>
         </p:txBody>
@@ -8644,7 +8660,7 @@
               <a:t>Patient</a:t>
             </a:r>
             <a:endParaRPr lang="en-US" sz="1000" b="0" strike="noStrike" spc="-1">
-              <a:latin typeface="Arial" panose="020B0604020202020204"/>
+              <a:latin typeface="Arial" panose="020B0604020202090204"/>
             </a:endParaRPr>
           </a:p>
         </p:txBody>
@@ -8842,7 +8858,7 @@
               <a:t>Y of D: </a:t>
             </a:r>
             <a:endParaRPr lang="en-US" sz="800" b="0" strike="noStrike" spc="-1">
-              <a:latin typeface="Arial" panose="020B0604020202020204"/>
+              <a:latin typeface="Arial" panose="020B0604020202090204"/>
             </a:endParaRPr>
           </a:p>
         </p:txBody>
@@ -8948,7 +8964,7 @@
               <a:t>Bio-material</a:t>
             </a:r>
             <a:endParaRPr lang="en-US" sz="1000" b="0" strike="noStrike" spc="-1">
-              <a:latin typeface="Arial" panose="020B0604020202020204"/>
+              <a:latin typeface="Arial" panose="020B0604020202090204"/>
             </a:endParaRPr>
           </a:p>
         </p:txBody>
@@ -9054,7 +9070,7 @@
               <a:t>Tumor content</a:t>
             </a:r>
             <a:endParaRPr lang="en-US" sz="1000" b="0" strike="noStrike" spc="-1" dirty="0">
-              <a:latin typeface="Arial" panose="020B0604020202020204"/>
+              <a:latin typeface="Arial" panose="020B0604020202090204"/>
             </a:endParaRPr>
           </a:p>
         </p:txBody>
@@ -9114,7 +9130,7 @@
               <a:solidFill>
                 <a:schemeClr val="bg1"/>
               </a:solidFill>
-              <a:latin typeface="Arial" panose="020B0604020202020204"/>
+              <a:latin typeface="Arial" panose="020B0604020202090204"/>
             </a:endParaRPr>
           </a:p>
           <a:p>
@@ -9136,7 +9152,7 @@
               <a:solidFill>
                 <a:schemeClr val="bg1"/>
               </a:solidFill>
-              <a:latin typeface="Arial" panose="020B0604020202020204"/>
+              <a:latin typeface="Arial" panose="020B0604020202090204"/>
             </a:endParaRPr>
           </a:p>
         </p:txBody>
@@ -9418,7 +9434,7 @@
               <a:t>MTB</a:t>
             </a:r>
             <a:endParaRPr lang="en-US" sz="1600" b="0" strike="noStrike" spc="-1">
-              <a:latin typeface="Arial" panose="020B0604020202020204"/>
+              <a:latin typeface="Arial" panose="020B0604020202090204"/>
             </a:endParaRPr>
           </a:p>
           <a:p>
@@ -9437,7 +9453,7 @@
               <a:t>Report </a:t>
             </a:r>
             <a:endParaRPr lang="en-US" sz="1000" b="0" strike="noStrike" spc="-1">
-              <a:latin typeface="Arial" panose="020B0604020202020204"/>
+              <a:latin typeface="Arial" panose="020B0604020202090204"/>
             </a:endParaRPr>
           </a:p>
         </p:txBody>
@@ -9494,7 +9510,7 @@
               <a:t>MDT</a:t>
             </a:r>
             <a:endParaRPr lang="en-US" sz="1600" b="0" strike="noStrike" spc="-1" dirty="0">
-              <a:latin typeface="Arial" panose="020B0604020202020204"/>
+              <a:latin typeface="Arial" panose="020B0604020202090204"/>
             </a:endParaRPr>
           </a:p>
           <a:p>
@@ -9513,7 +9529,7 @@
               <a:t>Report </a:t>
             </a:r>
             <a:endParaRPr lang="en-US" sz="1000" b="0" strike="noStrike" spc="-1" dirty="0">
-              <a:latin typeface="Arial" panose="020B0604020202020204"/>
+              <a:latin typeface="Arial" panose="020B0604020202090204"/>
             </a:endParaRPr>
           </a:p>
         </p:txBody>
@@ -9622,7 +9638,7 @@
               <a:t> </a:t>
             </a:r>
             <a:endParaRPr lang="en-US" sz="1400" b="0" strike="noStrike" spc="-1">
-              <a:latin typeface="Arial" panose="020B0604020202020204"/>
+              <a:latin typeface="Arial" panose="020B0604020202090204"/>
             </a:endParaRPr>
           </a:p>
         </p:txBody>
@@ -9635,8 +9651,8 @@
         </p:nvSpPr>
         <p:spPr>
           <a:xfrm>
-            <a:off x="6537525" y="1131590"/>
-            <a:ext cx="2633760" cy="242640"/>
+            <a:off x="6537525" y="1059835"/>
+            <a:ext cx="2633760" cy="396240"/>
           </a:xfrm>
           <a:prstGeom prst="rect">
             <a:avLst/>
@@ -9670,16 +9686,50 @@
               </a:lnSpc>
             </a:pPr>
             <a:r>
+              <a:rPr lang="nb-NO" altLang="en-US" sz="1000" b="0" strike="noStrike" spc="-1" dirty="0">
+                <a:solidFill>
+                  <a:srgbClr val="595959"/>
+                </a:solidFill>
+                <a:latin typeface="Calibri"/>
+              </a:rPr>
+              <a:t>Department of Pathology</a:t>
+            </a:r>
+            <a:r>
               <a:rPr lang="en-US" sz="1000" b="0" strike="noStrike" spc="-1" dirty="0">
                 <a:solidFill>
                   <a:srgbClr val="595959"/>
                 </a:solidFill>
                 <a:latin typeface="Calibri"/>
               </a:rPr>
-              <a:t>Genomics Core Facility, OUS</a:t>
+              <a:t>, </a:t>
             </a:r>
             <a:endParaRPr lang="en-US" sz="1000" b="0" strike="noStrike" spc="-1" dirty="0">
-              <a:latin typeface="Arial" panose="020B0604020202020204"/>
+              <a:solidFill>
+                <a:srgbClr val="595959"/>
+              </a:solidFill>
+              <a:latin typeface="Calibri"/>
+            </a:endParaRPr>
+          </a:p>
+          <a:p>
+            <a:pPr algn="ctr">
+              <a:lnSpc>
+                <a:spcPct val="100000"/>
+              </a:lnSpc>
+            </a:pPr>
+            <a:r>
+              <a:rPr lang="en-US" sz="1000" b="0" strike="noStrike" spc="-1" dirty="0">
+                <a:solidFill>
+                  <a:srgbClr val="595959"/>
+                </a:solidFill>
+                <a:latin typeface="Calibri"/>
+              </a:rPr>
+              <a:t>Oslo University Hospital</a:t>
+            </a:r>
+            <a:endParaRPr lang="en-US" sz="1000" b="0" strike="noStrike" spc="-1" dirty="0">
+              <a:solidFill>
+                <a:srgbClr val="595959"/>
+              </a:solidFill>
+              <a:latin typeface="Calibri"/>
             </a:endParaRPr>
           </a:p>
         </p:txBody>
@@ -9750,7 +9800,7 @@
               <a:t> </a:t>
             </a:r>
             <a:endParaRPr lang="en-US" sz="1400" b="0" strike="noStrike" spc="-1">
-              <a:latin typeface="Arial" panose="020B0604020202020204"/>
+              <a:latin typeface="Arial" panose="020B0604020202090204"/>
             </a:endParaRPr>
           </a:p>
         </p:txBody>
@@ -9846,7 +9896,7 @@
               <a:t> </a:t>
             </a:r>
             <a:endParaRPr lang="en-US" sz="1400" b="0" strike="noStrike" spc="-1">
-              <a:latin typeface="Arial" panose="020B0604020202020204"/>
+              <a:latin typeface="Arial" panose="020B0604020202090204"/>
             </a:endParaRPr>
           </a:p>
         </p:txBody>
@@ -9894,7 +9944,7 @@
               </a:lnSpc>
             </a:pPr>
             <a:endParaRPr lang="en-US" sz="800" b="0" strike="noStrike" spc="-1" dirty="0" smtClean="0">
-              <a:latin typeface="Arial" panose="020B0604020202020204"/>
+              <a:latin typeface="Arial" panose="020B0604020202090204"/>
             </a:endParaRPr>
           </a:p>
           <a:p>
@@ -9904,7 +9954,7 @@
               </a:lnSpc>
             </a:pPr>
             <a:endParaRPr lang="en-US" sz="800" spc="-1" dirty="0">
-              <a:latin typeface="Arial" panose="020B0604020202020204"/>
+              <a:latin typeface="Arial" panose="020B0604020202090204"/>
             </a:endParaRPr>
           </a:p>
           <a:p>
@@ -9914,7 +9964,7 @@
               </a:lnSpc>
             </a:pPr>
             <a:endParaRPr lang="en-US" sz="800" b="0" strike="noStrike" spc="-1" dirty="0">
-              <a:latin typeface="Arial" panose="020B0604020202020204"/>
+              <a:latin typeface="Arial" panose="020B0604020202090204"/>
             </a:endParaRPr>
           </a:p>
         </p:txBody>
@@ -10020,7 +10070,7 @@
               <a:t> </a:t>
             </a:r>
             <a:endParaRPr lang="en-US" sz="1400" b="0" strike="noStrike" spc="-1" dirty="0">
-              <a:latin typeface="Arial" panose="020B0604020202020204"/>
+              <a:latin typeface="Arial" panose="020B0604020202090204"/>
             </a:endParaRPr>
           </a:p>
         </p:txBody>
@@ -10086,7 +10136,7 @@
               <a:t> </a:t>
             </a:r>
             <a:endParaRPr lang="en-US" sz="1400" b="0" strike="noStrike" spc="-1" dirty="0">
-              <a:latin typeface="Arial" panose="020B0604020202020204"/>
+              <a:latin typeface="Arial" panose="020B0604020202090204"/>
             </a:endParaRPr>
           </a:p>
         </p:txBody>
@@ -10152,7 +10202,7 @@
               <a:t> </a:t>
             </a:r>
             <a:endParaRPr lang="en-US" sz="1400" b="0" strike="noStrike" spc="-1">
-              <a:latin typeface="Arial" panose="020B0604020202020204"/>
+              <a:latin typeface="Arial" panose="020B0604020202090204"/>
             </a:endParaRPr>
           </a:p>
         </p:txBody>
@@ -10360,7 +10410,7 @@
               <a:t>xx</a:t>
             </a:r>
             <a:endParaRPr lang="en-US" sz="1800" b="0" strike="noStrike" spc="-1" dirty="0">
-              <a:latin typeface="Arial" panose="020B0604020202020204"/>
+              <a:latin typeface="Arial" panose="020B0604020202090204"/>
             </a:endParaRPr>
           </a:p>
           <a:p>
@@ -10379,7 +10429,7 @@
               <a:t>XXX</a:t>
             </a:r>
             <a:endParaRPr lang="en-US" sz="1200" b="0" strike="noStrike" spc="-1" dirty="0">
-              <a:latin typeface="Arial" panose="020B0604020202020204"/>
+              <a:latin typeface="Arial" panose="020B0604020202090204"/>
             </a:endParaRPr>
           </a:p>
           <a:p>
@@ -10404,7 +10454,7 @@
                 </a:solidFill>
                 <a:latin typeface="Calibri"/>
               </a:rPr>
-              <a:t>4</a:t>
+              <a:t>5</a:t>
             </a:r>
             <a:endParaRPr lang="nb-NO" altLang="en-US" sz="800" b="0" strike="noStrike" spc="-1" dirty="0" smtClean="0">
               <a:solidFill>
@@ -10467,7 +10517,7 @@
               <a:t>MDT</a:t>
             </a:r>
             <a:endParaRPr lang="en-US" sz="1400" b="0" strike="noStrike" spc="-1" dirty="0">
-              <a:latin typeface="Arial" panose="020B0604020202020204"/>
+              <a:latin typeface="Arial" panose="020B0604020202090204"/>
             </a:endParaRPr>
           </a:p>
         </p:txBody>
@@ -10573,7 +10623,7 @@
               <a:t>QUALITY CONTROL MEASURES OF SEQUENCING DATA </a:t>
             </a:r>
             <a:endParaRPr lang="en-US" sz="1100" b="0" strike="noStrike" spc="-1" dirty="0">
-              <a:latin typeface="Arial" panose="020B0604020202020204"/>
+              <a:latin typeface="Arial" panose="020B0604020202090204"/>
             </a:endParaRPr>
           </a:p>
           <a:p>
@@ -10592,7 +10642,7 @@
               <a:t>  </a:t>
             </a:r>
             <a:endParaRPr lang="en-US" sz="1100" b="0" strike="noStrike" spc="-1" dirty="0">
-              <a:latin typeface="Arial" panose="020B0604020202020204"/>
+              <a:latin typeface="Arial" panose="020B0604020202090204"/>
             </a:endParaRPr>
           </a:p>
         </p:txBody>
@@ -10738,7 +10788,7 @@
               <a:t>Patient</a:t>
             </a:r>
             <a:endParaRPr lang="en-US" sz="1000" b="0" strike="noStrike" spc="-1">
-              <a:latin typeface="Arial" panose="020B0604020202020204"/>
+              <a:latin typeface="Arial" panose="020B0604020202090204"/>
             </a:endParaRPr>
           </a:p>
         </p:txBody>
@@ -10936,7 +10986,7 @@
               <a:t>Y of D: </a:t>
             </a:r>
             <a:endParaRPr lang="en-US" sz="800" b="0" strike="noStrike" spc="-1">
-              <a:latin typeface="Arial" panose="020B0604020202020204"/>
+              <a:latin typeface="Arial" panose="020B0604020202090204"/>
             </a:endParaRPr>
           </a:p>
         </p:txBody>
@@ -11042,7 +11092,7 @@
               <a:t>Bio-material</a:t>
             </a:r>
             <a:endParaRPr lang="en-US" sz="1000" b="0" strike="noStrike" spc="-1">
-              <a:latin typeface="Arial" panose="020B0604020202020204"/>
+              <a:latin typeface="Arial" panose="020B0604020202090204"/>
             </a:endParaRPr>
           </a:p>
         </p:txBody>
@@ -11148,7 +11198,7 @@
               <a:t>Tumor content</a:t>
             </a:r>
             <a:endParaRPr lang="en-US" sz="1000" b="0" strike="noStrike" spc="-1" dirty="0">
-              <a:latin typeface="Arial" panose="020B0604020202020204"/>
+              <a:latin typeface="Arial" panose="020B0604020202090204"/>
             </a:endParaRPr>
           </a:p>
         </p:txBody>
@@ -11208,7 +11258,7 @@
               <a:solidFill>
                 <a:schemeClr val="bg1"/>
               </a:solidFill>
-              <a:latin typeface="Arial" panose="020B0604020202020204"/>
+              <a:latin typeface="Arial" panose="020B0604020202090204"/>
             </a:endParaRPr>
           </a:p>
           <a:p>
@@ -11230,7 +11280,7 @@
               <a:solidFill>
                 <a:schemeClr val="bg1"/>
               </a:solidFill>
-              <a:latin typeface="Arial" panose="020B0604020202020204"/>
+              <a:latin typeface="Arial" panose="020B0604020202090204"/>
             </a:endParaRPr>
           </a:p>
         </p:txBody>
@@ -11724,8 +11774,8 @@
                         <a:t>indels</a:t>
                       </a:r>
                       <a:endParaRPr lang="en-US" sz="700" b="1" dirty="0">
-                        <a:latin typeface="Times New Roman" panose="02020603050405020304"/>
-                        <a:ea typeface="Times New Roman" panose="02020603050405020304"/>
+                        <a:latin typeface="Times New Roman" panose="02020503050405090304"/>
+                        <a:ea typeface="Times New Roman" panose="02020503050405090304"/>
                       </a:endParaRPr>
                     </a:p>
                   </a:txBody>
@@ -11859,8 +11909,8 @@
                         <a:solidFill>
                           <a:schemeClr val="tx1"/>
                         </a:solidFill>
-                        <a:latin typeface="Times New Roman" panose="02020603050405020304"/>
-                        <a:ea typeface="Times New Roman" panose="02020603050405020304"/>
+                        <a:latin typeface="Times New Roman" panose="02020503050405090304"/>
+                        <a:ea typeface="Times New Roman" panose="02020503050405090304"/>
                       </a:endParaRPr>
                     </a:p>
                   </a:txBody>
@@ -11895,8 +11945,8 @@
                         <a:solidFill>
                           <a:schemeClr val="tx1"/>
                         </a:solidFill>
-                        <a:latin typeface="Times New Roman" panose="02020603050405020304"/>
-                        <a:ea typeface="Times New Roman" panose="02020603050405020304"/>
+                        <a:latin typeface="Times New Roman" panose="02020503050405090304"/>
+                        <a:ea typeface="Times New Roman" panose="02020503050405090304"/>
                       </a:endParaRPr>
                     </a:p>
                     <a:p>
@@ -11920,8 +11970,8 @@
                         <a:solidFill>
                           <a:schemeClr val="tx1"/>
                         </a:solidFill>
-                        <a:latin typeface="Times New Roman" panose="02020603050405020304"/>
-                        <a:ea typeface="Times New Roman" panose="02020603050405020304"/>
+                        <a:latin typeface="Times New Roman" panose="02020503050405090304"/>
+                        <a:ea typeface="Times New Roman" panose="02020503050405090304"/>
                       </a:endParaRPr>
                     </a:p>
                     <a:p>
@@ -11945,8 +11995,8 @@
                         <a:solidFill>
                           <a:schemeClr val="tx1"/>
                         </a:solidFill>
-                        <a:latin typeface="Times New Roman" panose="02020603050405020304"/>
-                        <a:ea typeface="Times New Roman" panose="02020603050405020304"/>
+                        <a:latin typeface="Times New Roman" panose="02020503050405090304"/>
+                        <a:ea typeface="Times New Roman" panose="02020503050405090304"/>
                       </a:endParaRPr>
                     </a:p>
                   </a:txBody>
@@ -11974,8 +12024,8 @@
                         <a:t>Copy number variants</a:t>
                       </a:r>
                       <a:endParaRPr lang="en-US" sz="700" b="1" dirty="0">
-                        <a:latin typeface="Times New Roman" panose="02020603050405020304"/>
-                        <a:ea typeface="Times New Roman" panose="02020603050405020304"/>
+                        <a:latin typeface="Times New Roman" panose="02020503050405090304"/>
+                        <a:ea typeface="Times New Roman" panose="02020503050405090304"/>
                       </a:endParaRPr>
                     </a:p>
                   </a:txBody>
@@ -12003,7 +12053,7 @@
                       </a:pPr>
                       <a:endParaRPr lang="en-US" sz="700" dirty="0">
                         <a:latin typeface="+mn-lt"/>
-                        <a:ea typeface="Times New Roman" panose="02020603050405020304"/>
+                        <a:ea typeface="Times New Roman" panose="02020503050405090304"/>
                       </a:endParaRPr>
                     </a:p>
                   </a:txBody>
@@ -12031,20 +12081,20 @@
                       <a:r>
                         <a:rPr lang="en-US" sz="700" b="1" dirty="0" smtClean="0">
                           <a:latin typeface="+mn-lt"/>
-                          <a:ea typeface="Times New Roman" panose="02020603050405020304"/>
+                          <a:ea typeface="Times New Roman" panose="02020503050405090304"/>
                         </a:rPr>
                         <a:t>Gene</a:t>
                       </a:r>
                       <a:r>
                         <a:rPr lang="en-US" sz="700" b="1" baseline="0" dirty="0" smtClean="0">
                           <a:latin typeface="+mn-lt"/>
-                          <a:ea typeface="Times New Roman" panose="02020603050405020304"/>
+                          <a:ea typeface="Times New Roman" panose="02020503050405090304"/>
                         </a:rPr>
                         <a:t> fusions</a:t>
                       </a:r>
                       <a:endParaRPr lang="en-US" sz="700" b="1" baseline="0" dirty="0" smtClean="0">
                         <a:latin typeface="+mn-lt"/>
-                        <a:ea typeface="Times New Roman" panose="02020603050405020304"/>
+                        <a:ea typeface="Times New Roman" panose="02020503050405090304"/>
                       </a:endParaRPr>
                     </a:p>
                     <a:p>
@@ -12059,7 +12109,7 @@
                       <a:r>
                         <a:rPr lang="en-US" sz="700" b="0" baseline="0" dirty="0" smtClean="0">
                           <a:latin typeface="+mn-lt"/>
-                          <a:ea typeface="Times New Roman" panose="02020603050405020304"/>
+                          <a:ea typeface="Times New Roman" panose="02020503050405090304"/>
                         </a:rPr>
                         <a:t> </a:t>
                       </a:r>
@@ -12072,7 +12122,7 @@
                             </a:schemeClr>
                           </a:solidFill>
                           <a:latin typeface="+mn-lt"/>
-                          <a:ea typeface="Times New Roman" panose="02020603050405020304"/>
+                          <a:ea typeface="Times New Roman" panose="02020503050405090304"/>
                         </a:rPr>
                         <a:t>RNA</a:t>
                       </a:r>
@@ -12084,7 +12134,7 @@
                           </a:schemeClr>
                         </a:solidFill>
                         <a:latin typeface="+mn-lt"/>
-                        <a:ea typeface="Times New Roman" panose="02020603050405020304"/>
+                        <a:ea typeface="Times New Roman" panose="02020503050405090304"/>
                       </a:endParaRPr>
                     </a:p>
                   </a:txBody>
@@ -12112,7 +12162,7 @@
                       </a:pPr>
                       <a:endParaRPr lang="en-US" sz="700" dirty="0">
                         <a:latin typeface="+mn-lt"/>
-                        <a:ea typeface="Times New Roman" panose="02020603050405020304"/>
+                        <a:ea typeface="Times New Roman" panose="02020503050405090304"/>
                       </a:endParaRPr>
                     </a:p>
                   </a:txBody>
@@ -12176,8 +12226,8 @@
                         <a:t>TMB</a:t>
                       </a:r>
                       <a:endParaRPr lang="en-US" sz="1000" b="0" dirty="0">
-                        <a:latin typeface="Times New Roman" panose="02020603050405020304"/>
-                        <a:ea typeface="Times New Roman" panose="02020603050405020304"/>
+                        <a:latin typeface="Times New Roman" panose="02020503050405090304"/>
+                        <a:ea typeface="Times New Roman" panose="02020503050405090304"/>
                       </a:endParaRPr>
                     </a:p>
                   </a:txBody>
@@ -12212,8 +12262,8 @@
                         <a:defRPr/>
                       </a:pPr>
                       <a:endParaRPr lang="en-US" sz="600" dirty="0" smtClean="0">
-                        <a:latin typeface="Times New Roman" panose="02020603050405020304"/>
-                        <a:ea typeface="Times New Roman" panose="02020603050405020304"/>
+                        <a:latin typeface="Times New Roman" panose="02020503050405090304"/>
+                        <a:ea typeface="Times New Roman" panose="02020503050405090304"/>
                       </a:endParaRPr>
                     </a:p>
                     <a:p>
@@ -12234,8 +12284,8 @@
                         <a:defRPr/>
                       </a:pPr>
                       <a:endParaRPr lang="en-US" sz="600" dirty="0" smtClean="0">
-                        <a:latin typeface="Times New Roman" panose="02020603050405020304"/>
-                        <a:ea typeface="Times New Roman" panose="02020603050405020304"/>
+                        <a:latin typeface="Times New Roman" panose="02020503050405090304"/>
+                        <a:ea typeface="Times New Roman" panose="02020503050405090304"/>
                       </a:endParaRPr>
                     </a:p>
                     <a:p>
@@ -12256,8 +12306,8 @@
                         <a:defRPr/>
                       </a:pPr>
                       <a:endParaRPr lang="en-US" sz="600" dirty="0" smtClean="0">
-                        <a:latin typeface="Times New Roman" panose="02020603050405020304"/>
-                        <a:ea typeface="Times New Roman" panose="02020603050405020304"/>
+                        <a:latin typeface="Times New Roman" panose="02020503050405090304"/>
+                        <a:ea typeface="Times New Roman" panose="02020503050405090304"/>
                       </a:endParaRPr>
                     </a:p>
                     <a:p>
@@ -12278,8 +12328,8 @@
                         <a:defRPr/>
                       </a:pPr>
                       <a:endParaRPr lang="en-US" sz="600" dirty="0" smtClean="0">
-                        <a:latin typeface="Times New Roman" panose="02020603050405020304"/>
-                        <a:ea typeface="Times New Roman" panose="02020603050405020304"/>
+                        <a:latin typeface="Times New Roman" panose="02020503050405090304"/>
+                        <a:ea typeface="Times New Roman" panose="02020503050405090304"/>
                       </a:endParaRPr>
                     </a:p>
                   </a:txBody>
@@ -12342,8 +12392,8 @@
                         <a:t>status</a:t>
                       </a:r>
                       <a:endParaRPr lang="en-US" sz="800" b="0" dirty="0" smtClean="0">
-                        <a:latin typeface="Times New Roman" panose="02020603050405020304"/>
-                        <a:ea typeface="Times New Roman" panose="02020603050405020304"/>
+                        <a:latin typeface="Times New Roman" panose="02020503050405090304"/>
+                        <a:ea typeface="Times New Roman" panose="02020503050405090304"/>
                       </a:endParaRPr>
                     </a:p>
                   </a:txBody>
@@ -12370,8 +12420,8 @@
                         </a:spcAft>
                       </a:pPr>
                       <a:endParaRPr lang="en-US" sz="800" dirty="0">
-                        <a:latin typeface="Times New Roman" panose="02020603050405020304"/>
-                        <a:ea typeface="Times New Roman" panose="02020603050405020304"/>
+                        <a:latin typeface="Times New Roman" panose="02020503050405090304"/>
+                        <a:ea typeface="Times New Roman" panose="02020503050405090304"/>
                       </a:endParaRPr>
                     </a:p>
                   </a:txBody>
@@ -12832,7 +12882,7 @@
               <a:t>MDT</a:t>
             </a:r>
             <a:endParaRPr lang="en-US" sz="1600" b="0" strike="noStrike" spc="-1" dirty="0">
-              <a:latin typeface="Arial" panose="020B0604020202020204"/>
+              <a:latin typeface="Arial" panose="020B0604020202090204"/>
             </a:endParaRPr>
           </a:p>
           <a:p>
@@ -12851,7 +12901,7 @@
               <a:t>Report </a:t>
             </a:r>
             <a:endParaRPr lang="en-US" sz="1000" b="0" strike="noStrike" spc="-1" dirty="0">
-              <a:latin typeface="Arial" panose="020B0604020202020204"/>
+              <a:latin typeface="Arial" panose="020B0604020202090204"/>
             </a:endParaRPr>
           </a:p>
         </p:txBody>
@@ -12899,7 +12949,7 @@
               </a:lnSpc>
             </a:pPr>
             <a:endParaRPr lang="en-US" sz="800" b="0" strike="noStrike" spc="-1" dirty="0" smtClean="0">
-              <a:latin typeface="Arial" panose="020B0604020202020204"/>
+              <a:latin typeface="Arial" panose="020B0604020202090204"/>
             </a:endParaRPr>
           </a:p>
           <a:p>
@@ -12909,7 +12959,7 @@
               </a:lnSpc>
             </a:pPr>
             <a:endParaRPr lang="en-US" sz="800" spc="-1" dirty="0">
-              <a:latin typeface="Arial" panose="020B0604020202020204"/>
+              <a:latin typeface="Arial" panose="020B0604020202090204"/>
             </a:endParaRPr>
           </a:p>
           <a:p>
@@ -12919,7 +12969,7 @@
               </a:lnSpc>
             </a:pPr>
             <a:endParaRPr lang="en-US" sz="800" b="0" strike="noStrike" spc="-1" dirty="0" smtClean="0">
-              <a:latin typeface="Arial" panose="020B0604020202020204"/>
+              <a:latin typeface="Arial" panose="020B0604020202090204"/>
             </a:endParaRPr>
           </a:p>
           <a:p>
@@ -12929,7 +12979,7 @@
               </a:lnSpc>
             </a:pPr>
             <a:endParaRPr lang="en-US" sz="800" b="0" strike="noStrike" spc="-1" dirty="0">
-              <a:latin typeface="Arial" panose="020B0604020202020204"/>
+              <a:latin typeface="Arial" panose="020B0604020202090204"/>
             </a:endParaRPr>
           </a:p>
         </p:txBody>
@@ -13190,7 +13240,7 @@
               <a:t> </a:t>
             </a:r>
             <a:endParaRPr lang="en-US" sz="1400" b="0" strike="noStrike" spc="-1" dirty="0">
-              <a:latin typeface="Arial" panose="020B0604020202020204"/>
+              <a:latin typeface="Arial" panose="020B0604020202090204"/>
             </a:endParaRPr>
           </a:p>
         </p:txBody>
@@ -13256,7 +13306,7 @@
               <a:t> </a:t>
             </a:r>
             <a:endParaRPr lang="en-US" sz="1400" b="0" strike="noStrike" spc="-1" dirty="0">
-              <a:latin typeface="Arial" panose="020B0604020202020204"/>
+              <a:latin typeface="Arial" panose="020B0604020202090204"/>
             </a:endParaRPr>
           </a:p>
         </p:txBody>
@@ -13322,7 +13372,7 @@
               <a:t> </a:t>
             </a:r>
             <a:endParaRPr lang="en-US" sz="1400" b="0" strike="noStrike" spc="-1">
-              <a:latin typeface="Arial" panose="020B0604020202020204"/>
+              <a:latin typeface="Arial" panose="020B0604020202090204"/>
             </a:endParaRPr>
           </a:p>
         </p:txBody>
@@ -13530,7 +13580,7 @@
               <a:t>xx</a:t>
             </a:r>
             <a:endParaRPr lang="en-US" sz="1800" b="0" strike="noStrike" spc="-1" dirty="0">
-              <a:latin typeface="Arial" panose="020B0604020202020204"/>
+              <a:latin typeface="Arial" panose="020B0604020202090204"/>
             </a:endParaRPr>
           </a:p>
           <a:p>
@@ -13549,7 +13599,7 @@
               <a:t>XXX</a:t>
             </a:r>
             <a:endParaRPr lang="en-US" sz="1200" b="0" strike="noStrike" spc="-1" dirty="0">
-              <a:latin typeface="Arial" panose="020B0604020202020204"/>
+              <a:latin typeface="Arial" panose="020B0604020202090204"/>
             </a:endParaRPr>
           </a:p>
           <a:p>
@@ -13574,7 +13624,7 @@
                 </a:solidFill>
                 <a:latin typeface="Calibri"/>
               </a:rPr>
-              <a:t>4</a:t>
+              <a:t>5</a:t>
             </a:r>
             <a:endParaRPr lang="nb-NO" altLang="en-US" sz="800" b="0" strike="noStrike" spc="-1" dirty="0" smtClean="0">
               <a:solidFill>
@@ -13637,7 +13687,7 @@
               <a:t>MDT</a:t>
             </a:r>
             <a:endParaRPr lang="en-US" sz="1400" b="0" strike="noStrike" spc="-1" dirty="0">
-              <a:latin typeface="Arial" panose="020B0604020202020204"/>
+              <a:latin typeface="Arial" panose="020B0604020202090204"/>
             </a:endParaRPr>
           </a:p>
         </p:txBody>
@@ -13832,7 +13882,7 @@
               <a:t>Patient</a:t>
             </a:r>
             <a:endParaRPr lang="en-US" sz="1000" b="0" strike="noStrike" spc="-1">
-              <a:latin typeface="Arial" panose="020B0604020202020204"/>
+              <a:latin typeface="Arial" panose="020B0604020202090204"/>
             </a:endParaRPr>
           </a:p>
         </p:txBody>
@@ -14030,7 +14080,7 @@
               <a:t>Y of D: </a:t>
             </a:r>
             <a:endParaRPr lang="en-US" sz="800" b="0" strike="noStrike" spc="-1">
-              <a:latin typeface="Arial" panose="020B0604020202020204"/>
+              <a:latin typeface="Arial" panose="020B0604020202090204"/>
             </a:endParaRPr>
           </a:p>
         </p:txBody>
@@ -14136,7 +14186,7 @@
               <a:t>Bio-material</a:t>
             </a:r>
             <a:endParaRPr lang="en-US" sz="1000" b="0" strike="noStrike" spc="-1">
-              <a:latin typeface="Arial" panose="020B0604020202020204"/>
+              <a:latin typeface="Arial" panose="020B0604020202090204"/>
             </a:endParaRPr>
           </a:p>
         </p:txBody>
@@ -14242,7 +14292,7 @@
               <a:t>Tumor content</a:t>
             </a:r>
             <a:endParaRPr lang="en-US" sz="1000" b="0" strike="noStrike" spc="-1" dirty="0">
-              <a:latin typeface="Arial" panose="020B0604020202020204"/>
+              <a:latin typeface="Arial" panose="020B0604020202090204"/>
             </a:endParaRPr>
           </a:p>
         </p:txBody>
@@ -14350,7 +14400,7 @@
               <a:solidFill>
                 <a:schemeClr val="bg1"/>
               </a:solidFill>
-              <a:latin typeface="Arial" panose="020B0604020202020204"/>
+              <a:latin typeface="Arial" panose="020B0604020202090204"/>
             </a:endParaRPr>
           </a:p>
           <a:p>
@@ -14372,7 +14422,7 @@
               <a:solidFill>
                 <a:schemeClr val="bg1"/>
               </a:solidFill>
-              <a:latin typeface="Arial" panose="020B0604020202020204"/>
+              <a:latin typeface="Arial" panose="020B0604020202090204"/>
             </a:endParaRPr>
           </a:p>
         </p:txBody>
@@ -14773,8 +14823,8 @@
                         <a:t>indels</a:t>
                       </a:r>
                       <a:endParaRPr lang="en-US" sz="700" b="1" dirty="0">
-                        <a:latin typeface="Times New Roman" panose="02020603050405020304"/>
-                        <a:ea typeface="Times New Roman" panose="02020603050405020304"/>
+                        <a:latin typeface="Times New Roman" panose="02020503050405090304"/>
+                        <a:ea typeface="Times New Roman" panose="02020503050405090304"/>
                       </a:endParaRPr>
                     </a:p>
                   </a:txBody>
@@ -14908,8 +14958,8 @@
                         <a:solidFill>
                           <a:schemeClr val="tx1"/>
                         </a:solidFill>
-                        <a:latin typeface="Times New Roman" panose="02020603050405020304"/>
-                        <a:ea typeface="Times New Roman" panose="02020603050405020304"/>
+                        <a:latin typeface="Times New Roman" panose="02020503050405090304"/>
+                        <a:ea typeface="Times New Roman" panose="02020503050405090304"/>
                       </a:endParaRPr>
                     </a:p>
                   </a:txBody>
@@ -14944,8 +14994,8 @@
                         <a:solidFill>
                           <a:schemeClr val="tx1"/>
                         </a:solidFill>
-                        <a:latin typeface="Times New Roman" panose="02020603050405020304"/>
-                        <a:ea typeface="Times New Roman" panose="02020603050405020304"/>
+                        <a:latin typeface="Times New Roman" panose="02020503050405090304"/>
+                        <a:ea typeface="Times New Roman" panose="02020503050405090304"/>
                       </a:endParaRPr>
                     </a:p>
                     <a:p>
@@ -14969,8 +15019,8 @@
                         <a:solidFill>
                           <a:schemeClr val="tx1"/>
                         </a:solidFill>
-                        <a:latin typeface="Times New Roman" panose="02020603050405020304"/>
-                        <a:ea typeface="Times New Roman" panose="02020603050405020304"/>
+                        <a:latin typeface="Times New Roman" panose="02020503050405090304"/>
+                        <a:ea typeface="Times New Roman" panose="02020503050405090304"/>
                       </a:endParaRPr>
                     </a:p>
                     <a:p>
@@ -14994,8 +15044,8 @@
                         <a:solidFill>
                           <a:schemeClr val="tx1"/>
                         </a:solidFill>
-                        <a:latin typeface="Times New Roman" panose="02020603050405020304"/>
-                        <a:ea typeface="Times New Roman" panose="02020603050405020304"/>
+                        <a:latin typeface="Times New Roman" panose="02020503050405090304"/>
+                        <a:ea typeface="Times New Roman" panose="02020503050405090304"/>
                       </a:endParaRPr>
                     </a:p>
                   </a:txBody>
@@ -15023,8 +15073,8 @@
                         <a:t>Copy number variants</a:t>
                       </a:r>
                       <a:endParaRPr lang="en-US" sz="700" b="1" dirty="0">
-                        <a:latin typeface="Times New Roman" panose="02020603050405020304"/>
-                        <a:ea typeface="Times New Roman" panose="02020603050405020304"/>
+                        <a:latin typeface="Times New Roman" panose="02020503050405090304"/>
+                        <a:ea typeface="Times New Roman" panose="02020503050405090304"/>
                       </a:endParaRPr>
                     </a:p>
                   </a:txBody>
@@ -15052,7 +15102,7 @@
                       </a:pPr>
                       <a:endParaRPr lang="en-US" sz="700" dirty="0">
                         <a:latin typeface="+mn-lt"/>
-                        <a:ea typeface="Times New Roman" panose="02020603050405020304"/>
+                        <a:ea typeface="Times New Roman" panose="02020503050405090304"/>
                       </a:endParaRPr>
                     </a:p>
                   </a:txBody>
@@ -15080,20 +15130,20 @@
                       <a:r>
                         <a:rPr lang="en-US" sz="700" b="1" dirty="0" smtClean="0">
                           <a:latin typeface="+mn-lt"/>
-                          <a:ea typeface="Times New Roman" panose="02020603050405020304"/>
+                          <a:ea typeface="Times New Roman" panose="02020503050405090304"/>
                         </a:rPr>
                         <a:t>Gene</a:t>
                       </a:r>
                       <a:r>
                         <a:rPr lang="en-US" sz="700" b="1" baseline="0" dirty="0" smtClean="0">
                           <a:latin typeface="+mn-lt"/>
-                          <a:ea typeface="Times New Roman" panose="02020603050405020304"/>
+                          <a:ea typeface="Times New Roman" panose="02020503050405090304"/>
                         </a:rPr>
                         <a:t> fusions</a:t>
                       </a:r>
                       <a:endParaRPr lang="en-US" sz="700" b="1" baseline="0" dirty="0" smtClean="0">
                         <a:latin typeface="+mn-lt"/>
-                        <a:ea typeface="Times New Roman" panose="02020603050405020304"/>
+                        <a:ea typeface="Times New Roman" panose="02020503050405090304"/>
                       </a:endParaRPr>
                     </a:p>
                     <a:p>
@@ -15108,7 +15158,7 @@
                       <a:r>
                         <a:rPr lang="en-US" sz="700" b="0" baseline="0" dirty="0" smtClean="0">
                           <a:latin typeface="+mn-lt"/>
-                          <a:ea typeface="Times New Roman" panose="02020603050405020304"/>
+                          <a:ea typeface="Times New Roman" panose="02020503050405090304"/>
                         </a:rPr>
                         <a:t> </a:t>
                       </a:r>
@@ -15121,7 +15171,7 @@
                             </a:schemeClr>
                           </a:solidFill>
                           <a:latin typeface="+mn-lt"/>
-                          <a:ea typeface="Times New Roman" panose="02020603050405020304"/>
+                          <a:ea typeface="Times New Roman" panose="02020503050405090304"/>
                         </a:rPr>
                         <a:t>RNA</a:t>
                       </a:r>
@@ -15133,7 +15183,7 @@
                           </a:schemeClr>
                         </a:solidFill>
                         <a:latin typeface="+mn-lt"/>
-                        <a:ea typeface="Times New Roman" panose="02020603050405020304"/>
+                        <a:ea typeface="Times New Roman" panose="02020503050405090304"/>
                       </a:endParaRPr>
                     </a:p>
                   </a:txBody>
@@ -15161,7 +15211,7 @@
                       </a:pPr>
                       <a:endParaRPr lang="en-US" sz="700" dirty="0">
                         <a:latin typeface="+mn-lt"/>
-                        <a:ea typeface="Times New Roman" panose="02020603050405020304"/>
+                        <a:ea typeface="Times New Roman" panose="02020503050405090304"/>
                       </a:endParaRPr>
                     </a:p>
                   </a:txBody>
@@ -15225,8 +15275,8 @@
                         <a:t>TMB</a:t>
                       </a:r>
                       <a:endParaRPr lang="en-US" sz="1000" b="0" dirty="0">
-                        <a:latin typeface="Times New Roman" panose="02020603050405020304"/>
-                        <a:ea typeface="Times New Roman" panose="02020603050405020304"/>
+                        <a:latin typeface="Times New Roman" panose="02020503050405090304"/>
+                        <a:ea typeface="Times New Roman" panose="02020503050405090304"/>
                       </a:endParaRPr>
                     </a:p>
                   </a:txBody>
@@ -15261,8 +15311,8 @@
                         <a:defRPr/>
                       </a:pPr>
                       <a:endParaRPr lang="en-US" sz="600" dirty="0" smtClean="0">
-                        <a:latin typeface="Times New Roman" panose="02020603050405020304"/>
-                        <a:ea typeface="Times New Roman" panose="02020603050405020304"/>
+                        <a:latin typeface="Times New Roman" panose="02020503050405090304"/>
+                        <a:ea typeface="Times New Roman" panose="02020503050405090304"/>
                       </a:endParaRPr>
                     </a:p>
                     <a:p>
@@ -15283,8 +15333,8 @@
                         <a:defRPr/>
                       </a:pPr>
                       <a:endParaRPr lang="en-US" sz="600" dirty="0" smtClean="0">
-                        <a:latin typeface="Times New Roman" panose="02020603050405020304"/>
-                        <a:ea typeface="Times New Roman" panose="02020603050405020304"/>
+                        <a:latin typeface="Times New Roman" panose="02020503050405090304"/>
+                        <a:ea typeface="Times New Roman" panose="02020503050405090304"/>
                       </a:endParaRPr>
                     </a:p>
                     <a:p>
@@ -15305,8 +15355,8 @@
                         <a:defRPr/>
                       </a:pPr>
                       <a:endParaRPr lang="en-US" sz="600" dirty="0" smtClean="0">
-                        <a:latin typeface="Times New Roman" panose="02020603050405020304"/>
-                        <a:ea typeface="Times New Roman" panose="02020603050405020304"/>
+                        <a:latin typeface="Times New Roman" panose="02020503050405090304"/>
+                        <a:ea typeface="Times New Roman" panose="02020503050405090304"/>
                       </a:endParaRPr>
                     </a:p>
                     <a:p>
@@ -15327,8 +15377,8 @@
                         <a:defRPr/>
                       </a:pPr>
                       <a:endParaRPr lang="en-US" sz="600" dirty="0" smtClean="0">
-                        <a:latin typeface="Times New Roman" panose="02020603050405020304"/>
-                        <a:ea typeface="Times New Roman" panose="02020603050405020304"/>
+                        <a:latin typeface="Times New Roman" panose="02020503050405090304"/>
+                        <a:ea typeface="Times New Roman" panose="02020503050405090304"/>
                       </a:endParaRPr>
                     </a:p>
                   </a:txBody>
@@ -15391,8 +15441,8 @@
                         <a:t>status</a:t>
                       </a:r>
                       <a:endParaRPr lang="en-US" sz="800" b="0" dirty="0" smtClean="0">
-                        <a:latin typeface="Times New Roman" panose="02020603050405020304"/>
-                        <a:ea typeface="Times New Roman" panose="02020603050405020304"/>
+                        <a:latin typeface="Times New Roman" panose="02020503050405090304"/>
+                        <a:ea typeface="Times New Roman" panose="02020503050405090304"/>
                       </a:endParaRPr>
                     </a:p>
                   </a:txBody>
@@ -15419,8 +15469,8 @@
                         </a:spcAft>
                       </a:pPr>
                       <a:endParaRPr lang="en-US" sz="800" dirty="0">
-                        <a:latin typeface="Times New Roman" panose="02020603050405020304"/>
-                        <a:ea typeface="Times New Roman" panose="02020603050405020304"/>
+                        <a:latin typeface="Times New Roman" panose="02020503050405090304"/>
+                        <a:ea typeface="Times New Roman" panose="02020503050405090304"/>
                       </a:endParaRPr>
                     </a:p>
                   </a:txBody>
@@ -15976,7 +16026,7 @@
                           </a:solidFill>
                           <a:latin typeface="Calibri"/>
                           <a:ea typeface="Calibri"/>
-                          <a:cs typeface="Times New Roman" panose="02020603050405020304"/>
+                          <a:cs typeface="Times New Roman" panose="02020503050405090304"/>
                         </a:rPr>
                         <a:t>Gene</a:t>
                       </a:r>
@@ -15986,7 +16036,7 @@
                         </a:solidFill>
                         <a:latin typeface="Calibri"/>
                         <a:ea typeface="Calibri"/>
-                        <a:cs typeface="Times New Roman" panose="02020603050405020304"/>
+                        <a:cs typeface="Times New Roman" panose="02020503050405090304"/>
                       </a:endParaRPr>
                     </a:p>
                   </a:txBody>
@@ -16043,7 +16093,7 @@
                           </a:solidFill>
                           <a:latin typeface="Calibri"/>
                           <a:ea typeface="Calibri"/>
-                          <a:cs typeface="Times New Roman" panose="02020603050405020304"/>
+                          <a:cs typeface="Times New Roman" panose="02020503050405090304"/>
                         </a:rPr>
                         <a:t>Variant</a:t>
                       </a:r>
@@ -16053,7 +16103,7 @@
                         </a:solidFill>
                         <a:latin typeface="Calibri"/>
                         <a:ea typeface="Calibri"/>
-                        <a:cs typeface="Times New Roman" panose="02020603050405020304"/>
+                        <a:cs typeface="Times New Roman" panose="02020503050405090304"/>
                       </a:endParaRPr>
                     </a:p>
                   </a:txBody>
@@ -16116,7 +16166,7 @@
                           </a:solidFill>
                           <a:latin typeface="Calibri"/>
                           <a:ea typeface="Calibri"/>
-                          <a:cs typeface="Times New Roman" panose="02020603050405020304"/>
+                          <a:cs typeface="Times New Roman" panose="02020503050405090304"/>
                         </a:rPr>
                         <a:t>Type</a:t>
                       </a:r>
@@ -16126,7 +16176,7 @@
                         </a:solidFill>
                         <a:latin typeface="Calibri"/>
                         <a:ea typeface="Calibri"/>
-                        <a:cs typeface="Times New Roman" panose="02020603050405020304"/>
+                        <a:cs typeface="Times New Roman" panose="02020503050405090304"/>
                       </a:endParaRPr>
                     </a:p>
                   </a:txBody>
@@ -16192,7 +16242,7 @@
                           </a:solidFill>
                           <a:latin typeface="Calibri"/>
                           <a:ea typeface="Calibri"/>
-                          <a:cs typeface="Times New Roman" panose="02020603050405020304"/>
+                          <a:cs typeface="Times New Roman" panose="02020503050405090304"/>
                         </a:rPr>
                         <a:t>VAF</a:t>
                       </a:r>
@@ -16203,7 +16253,7 @@
                           </a:solidFill>
                           <a:latin typeface="Calibri"/>
                           <a:ea typeface="Calibri"/>
-                          <a:cs typeface="Times New Roman" panose="02020603050405020304"/>
+                          <a:cs typeface="Times New Roman" panose="02020503050405090304"/>
                         </a:rPr>
                         <a:t>/</a:t>
                       </a:r>
@@ -16213,7 +16263,7 @@
                         </a:solidFill>
                         <a:latin typeface="Calibri"/>
                         <a:ea typeface="Calibri"/>
-                        <a:cs typeface="Times New Roman" panose="02020603050405020304"/>
+                        <a:cs typeface="Times New Roman" panose="02020503050405090304"/>
                       </a:endParaRPr>
                     </a:p>
                     <a:p>
@@ -16235,7 +16285,7 @@
                           </a:solidFill>
                           <a:latin typeface="Calibri"/>
                           <a:ea typeface="Calibri"/>
-                          <a:cs typeface="Times New Roman" panose="02020603050405020304"/>
+                          <a:cs typeface="Times New Roman" panose="02020503050405090304"/>
                         </a:rPr>
                         <a:t>CN </a:t>
                       </a:r>
@@ -16245,7 +16295,7 @@
                         </a:solidFill>
                         <a:latin typeface="Calibri"/>
                         <a:ea typeface="Calibri"/>
-                        <a:cs typeface="Times New Roman" panose="02020603050405020304"/>
+                        <a:cs typeface="Times New Roman" panose="02020503050405090304"/>
                       </a:endParaRPr>
                     </a:p>
                   </a:txBody>
@@ -16308,7 +16358,7 @@
                           </a:solidFill>
                           <a:latin typeface="Calibri"/>
                           <a:ea typeface="Calibri"/>
-                          <a:cs typeface="Times New Roman" panose="02020603050405020304"/>
+                          <a:cs typeface="Times New Roman" panose="02020503050405090304"/>
                         </a:rPr>
                         <a:t>Variant</a:t>
                       </a:r>
@@ -16318,7 +16368,7 @@
                         </a:solidFill>
                         <a:latin typeface="Calibri"/>
                         <a:ea typeface="Calibri"/>
-                        <a:cs typeface="Times New Roman" panose="02020603050405020304"/>
+                        <a:cs typeface="Times New Roman" panose="02020503050405090304"/>
                       </a:endParaRPr>
                     </a:p>
                     <a:p>
@@ -16340,7 +16390,7 @@
                           </a:solidFill>
                           <a:latin typeface="Calibri"/>
                           <a:ea typeface="Calibri"/>
-                          <a:cs typeface="Times New Roman" panose="02020603050405020304"/>
+                          <a:cs typeface="Times New Roman" panose="02020503050405090304"/>
                         </a:rPr>
                         <a:t>GoF/</a:t>
                       </a:r>
@@ -16350,7 +16400,7 @@
                         </a:solidFill>
                         <a:latin typeface="Calibri"/>
                         <a:ea typeface="Calibri"/>
-                        <a:cs typeface="Times New Roman" panose="02020603050405020304"/>
+                        <a:cs typeface="Times New Roman" panose="02020503050405090304"/>
                       </a:endParaRPr>
                     </a:p>
                     <a:p>
@@ -16372,7 +16422,7 @@
                           </a:solidFill>
                           <a:latin typeface="Calibri"/>
                           <a:ea typeface="Calibri"/>
-                          <a:cs typeface="Times New Roman" panose="02020603050405020304"/>
+                          <a:cs typeface="Times New Roman" panose="02020503050405090304"/>
                         </a:rPr>
                         <a:t>LoF</a:t>
                       </a:r>
@@ -16382,7 +16432,7 @@
                         </a:solidFill>
                         <a:latin typeface="Calibri"/>
                         <a:ea typeface="Calibri"/>
-                        <a:cs typeface="Times New Roman" panose="02020603050405020304"/>
+                        <a:cs typeface="Times New Roman" panose="02020503050405090304"/>
                       </a:endParaRPr>
                     </a:p>
                   </a:txBody>
@@ -16445,7 +16495,7 @@
                           </a:solidFill>
                           <a:latin typeface="Calibri"/>
                           <a:ea typeface="Calibri"/>
-                          <a:cs typeface="Times New Roman" panose="02020603050405020304"/>
+                          <a:cs typeface="Times New Roman" panose="02020503050405090304"/>
                         </a:rPr>
                         <a:t>Pathway</a:t>
                       </a:r>
@@ -16456,7 +16506,7 @@
                           </a:solidFill>
                           <a:latin typeface="Calibri"/>
                           <a:ea typeface="Calibri"/>
-                          <a:cs typeface="Times New Roman" panose="02020603050405020304"/>
+                          <a:cs typeface="Times New Roman" panose="02020503050405090304"/>
                         </a:rPr>
                         <a:t>/</a:t>
                       </a:r>
@@ -16466,7 +16516,7 @@
                         </a:solidFill>
                         <a:latin typeface="Calibri"/>
                         <a:ea typeface="Calibri"/>
-                        <a:cs typeface="Times New Roman" panose="02020603050405020304"/>
+                        <a:cs typeface="Times New Roman" panose="02020503050405090304"/>
                       </a:endParaRPr>
                     </a:p>
                     <a:p>
@@ -16488,7 +16538,7 @@
                           </a:solidFill>
                           <a:latin typeface="Calibri"/>
                           <a:ea typeface="Calibri"/>
-                          <a:cs typeface="Times New Roman" panose="02020603050405020304"/>
+                          <a:cs typeface="Times New Roman" panose="02020503050405090304"/>
                         </a:rPr>
                         <a:t>function</a:t>
                       </a:r>
@@ -16498,7 +16548,7 @@
                         </a:solidFill>
                         <a:latin typeface="Calibri"/>
                         <a:ea typeface="Calibri"/>
-                        <a:cs typeface="Times New Roman" panose="02020603050405020304"/>
+                        <a:cs typeface="Times New Roman" panose="02020503050405090304"/>
                       </a:endParaRPr>
                     </a:p>
                   </a:txBody>
@@ -16561,7 +16611,7 @@
                           </a:solidFill>
                           <a:latin typeface="Calibri"/>
                           <a:ea typeface="Calibri"/>
-                          <a:cs typeface="Times New Roman" panose="02020603050405020304"/>
+                          <a:cs typeface="Times New Roman" panose="02020503050405090304"/>
                         </a:rPr>
                         <a:t>Therapeutic context</a:t>
                       </a:r>
@@ -16571,7 +16621,7 @@
                         </a:solidFill>
                         <a:latin typeface="Calibri"/>
                         <a:ea typeface="Calibri"/>
-                        <a:cs typeface="Times New Roman" panose="02020603050405020304"/>
+                        <a:cs typeface="Times New Roman" panose="02020503050405090304"/>
                       </a:endParaRPr>
                     </a:p>
                   </a:txBody>
@@ -16643,7 +16693,7 @@
                           </a:solidFill>
                           <a:latin typeface="Calibri"/>
                           <a:ea typeface="Calibri"/>
-                          <a:cs typeface="Times New Roman" panose="02020603050405020304"/>
+                          <a:cs typeface="Times New Roman" panose="02020503050405090304"/>
                         </a:rPr>
                         <a:t>Level of Evidence</a:t>
                       </a:r>
@@ -16653,7 +16703,7 @@
                         </a:solidFill>
                         <a:latin typeface="Calibri"/>
                         <a:ea typeface="Calibri"/>
-                        <a:cs typeface="Times New Roman" panose="02020603050405020304"/>
+                        <a:cs typeface="Times New Roman" panose="02020503050405090304"/>
                       </a:endParaRPr>
                     </a:p>
                   </a:txBody>
@@ -16745,7 +16795,7 @@
                           </a:solidFill>
                           <a:latin typeface="Calibri"/>
                           <a:ea typeface="Calibri"/>
-                          <a:cs typeface="Times New Roman" panose="02020603050405020304"/>
+                          <a:cs typeface="Times New Roman" panose="02020503050405090304"/>
                         </a:rPr>
                         <a:t>Sensitive</a:t>
                       </a:r>
@@ -16755,7 +16805,7 @@
                         </a:solidFill>
                         <a:latin typeface="Calibri"/>
                         <a:ea typeface="Calibri"/>
-                        <a:cs typeface="Times New Roman" panose="02020603050405020304"/>
+                        <a:cs typeface="Times New Roman" panose="02020503050405090304"/>
                       </a:endParaRPr>
                     </a:p>
                   </a:txBody>
@@ -16812,7 +16862,7 @@
                           </a:solidFill>
                           <a:latin typeface="Calibri"/>
                           <a:ea typeface="Calibri"/>
-                          <a:cs typeface="Times New Roman" panose="02020603050405020304"/>
+                          <a:cs typeface="Times New Roman" panose="02020503050405090304"/>
                         </a:rPr>
                         <a:t>Resistant</a:t>
                       </a:r>
@@ -16822,7 +16872,7 @@
                         </a:solidFill>
                         <a:latin typeface="Calibri"/>
                         <a:ea typeface="Calibri"/>
-                        <a:cs typeface="Times New Roman" panose="02020603050405020304"/>
+                        <a:cs typeface="Times New Roman" panose="02020503050405090304"/>
                       </a:endParaRPr>
                     </a:p>
                   </a:txBody>
@@ -16879,7 +16929,7 @@
                           </a:solidFill>
                           <a:latin typeface="Calibri"/>
                           <a:ea typeface="Calibri"/>
-                          <a:cs typeface="Times New Roman" panose="02020603050405020304"/>
+                          <a:cs typeface="Times New Roman" panose="02020503050405090304"/>
                         </a:rPr>
                         <a:t>Patient’s </a:t>
                       </a:r>
@@ -16890,7 +16940,7 @@
                           </a:solidFill>
                           <a:latin typeface="Calibri"/>
                           <a:ea typeface="Calibri"/>
-                          <a:cs typeface="Times New Roman" panose="02020603050405020304"/>
+                          <a:cs typeface="Times New Roman" panose="02020503050405090304"/>
                         </a:rPr>
                         <a:t>tumor type</a:t>
                       </a:r>
@@ -16900,7 +16950,7 @@
                         </a:solidFill>
                         <a:latin typeface="Calibri"/>
                         <a:ea typeface="Calibri"/>
-                        <a:cs typeface="Times New Roman" panose="02020603050405020304"/>
+                        <a:cs typeface="Times New Roman" panose="02020503050405090304"/>
                       </a:endParaRPr>
                     </a:p>
                   </a:txBody>
@@ -16957,7 +17007,7 @@
                           </a:solidFill>
                           <a:latin typeface="Calibri"/>
                           <a:ea typeface="Calibri"/>
-                          <a:cs typeface="Times New Roman" panose="02020603050405020304"/>
+                          <a:cs typeface="Times New Roman" panose="02020503050405090304"/>
                         </a:rPr>
                         <a:t>Other tumor type</a:t>
                       </a:r>
@@ -16967,7 +17017,7 @@
                         </a:solidFill>
                         <a:latin typeface="Calibri"/>
                         <a:ea typeface="Calibri"/>
-                        <a:cs typeface="Times New Roman" panose="02020603050405020304"/>
+                        <a:cs typeface="Times New Roman" panose="02020503050405090304"/>
                       </a:endParaRPr>
                     </a:p>
                   </a:txBody>
@@ -17020,7 +17070,7 @@
                           </a:solidFill>
                           <a:latin typeface="Calibri"/>
                           <a:ea typeface="Calibri"/>
-                          <a:cs typeface="Times New Roman" panose="02020603050405020304"/>
+                          <a:cs typeface="Times New Roman" panose="02020503050405090304"/>
                         </a:rPr>
                         <a:t>--</a:t>
                       </a:r>
@@ -17030,7 +17080,7 @@
                         </a:solidFill>
                         <a:latin typeface="Calibri"/>
                         <a:ea typeface="Calibri"/>
-                        <a:cs typeface="Times New Roman" panose="02020603050405020304"/>
+                        <a:cs typeface="Times New Roman" panose="02020503050405090304"/>
                       </a:endParaRPr>
                     </a:p>
                   </a:txBody>
@@ -17076,7 +17126,7 @@
                         </a:solidFill>
                         <a:latin typeface="Calibri"/>
                         <a:ea typeface="Calibri"/>
-                        <a:cs typeface="Times New Roman" panose="02020603050405020304"/>
+                        <a:cs typeface="Times New Roman" panose="02020503050405090304"/>
                       </a:endParaRPr>
                     </a:p>
                   </a:txBody>
@@ -17122,7 +17172,7 @@
                         </a:solidFill>
                         <a:latin typeface="Calibri"/>
                         <a:ea typeface="Calibri"/>
-                        <a:cs typeface="Times New Roman" panose="02020603050405020304"/>
+                        <a:cs typeface="Times New Roman" panose="02020503050405090304"/>
                       </a:endParaRPr>
                     </a:p>
                   </a:txBody>
@@ -17171,7 +17221,7 @@
                         </a:solidFill>
                         <a:latin typeface="Calibri"/>
                         <a:ea typeface="Calibri"/>
-                        <a:cs typeface="Times New Roman" panose="02020603050405020304"/>
+                        <a:cs typeface="Times New Roman" panose="02020503050405090304"/>
                       </a:endParaRPr>
                     </a:p>
                   </a:txBody>
@@ -17217,7 +17267,7 @@
                         </a:solidFill>
                         <a:latin typeface="Calibri"/>
                         <a:ea typeface="Calibri"/>
-                        <a:cs typeface="Times New Roman" panose="02020603050405020304"/>
+                        <a:cs typeface="Times New Roman" panose="02020503050405090304"/>
                       </a:endParaRPr>
                     </a:p>
                   </a:txBody>
@@ -17263,7 +17313,7 @@
                         </a:solidFill>
                         <a:latin typeface="Calibri"/>
                         <a:ea typeface="Calibri"/>
-                        <a:cs typeface="Times New Roman" panose="02020603050405020304"/>
+                        <a:cs typeface="Times New Roman" panose="02020503050405090304"/>
                       </a:endParaRPr>
                     </a:p>
                   </a:txBody>
@@ -17309,7 +17359,7 @@
                         </a:solidFill>
                         <a:latin typeface="Calibri"/>
                         <a:ea typeface="Calibri"/>
-                        <a:cs typeface="Times New Roman" panose="02020603050405020304"/>
+                        <a:cs typeface="Times New Roman" panose="02020503050405090304"/>
                       </a:endParaRPr>
                     </a:p>
                   </a:txBody>
@@ -17393,7 +17443,7 @@
                         </a:solidFill>
                         <a:latin typeface="Calibri"/>
                         <a:ea typeface="Calibri"/>
-                        <a:cs typeface="Times New Roman" panose="02020603050405020304"/>
+                        <a:cs typeface="Times New Roman" panose="02020503050405090304"/>
                       </a:endParaRPr>
                     </a:p>
                   </a:txBody>
@@ -17439,7 +17489,7 @@
                         </a:solidFill>
                         <a:latin typeface="Calibri"/>
                         <a:ea typeface="Calibri"/>
-                        <a:cs typeface="Times New Roman" panose="02020603050405020304"/>
+                        <a:cs typeface="Times New Roman" panose="02020503050405090304"/>
                       </a:endParaRPr>
                     </a:p>
                   </a:txBody>
@@ -17488,7 +17538,7 @@
                           </a:solidFill>
                           <a:latin typeface="Calibri"/>
                           <a:ea typeface="Calibri"/>
-                          <a:cs typeface="Times New Roman" panose="02020603050405020304"/>
+                          <a:cs typeface="Times New Roman" panose="02020503050405090304"/>
                         </a:rPr>
                         <a:t>Variant classification </a:t>
                       </a:r>
@@ -17498,7 +17548,7 @@
                         </a:solidFill>
                         <a:latin typeface="Calibri"/>
                         <a:ea typeface="Calibri"/>
-                        <a:cs typeface="Times New Roman" panose="02020603050405020304"/>
+                        <a:cs typeface="Times New Roman" panose="02020503050405090304"/>
                       </a:endParaRPr>
                     </a:p>
                   </a:txBody>
@@ -17590,7 +17640,7 @@
                         </a:solidFill>
                         <a:latin typeface="Calibri"/>
                         <a:ea typeface="Calibri"/>
-                        <a:cs typeface="Times New Roman" panose="02020603050405020304"/>
+                        <a:cs typeface="Times New Roman" panose="02020503050405090304"/>
                       </a:endParaRPr>
                     </a:p>
                   </a:txBody>
@@ -17824,7 +17874,7 @@
                           </a:solidFill>
                           <a:latin typeface="Calibri"/>
                           <a:ea typeface="Calibri"/>
-                          <a:cs typeface="Times New Roman" panose="02020603050405020304"/>
+                          <a:cs typeface="Times New Roman" panose="02020503050405090304"/>
                         </a:rPr>
                         <a:t>Gene</a:t>
                       </a:r>
@@ -17834,7 +17884,7 @@
                         </a:solidFill>
                         <a:latin typeface="Calibri"/>
                         <a:ea typeface="Calibri"/>
-                        <a:cs typeface="Times New Roman" panose="02020603050405020304"/>
+                        <a:cs typeface="Times New Roman" panose="02020503050405090304"/>
                       </a:endParaRPr>
                     </a:p>
                   </a:txBody>
@@ -17894,7 +17944,7 @@
                           </a:solidFill>
                           <a:latin typeface="Calibri"/>
                           <a:ea typeface="Calibri"/>
-                          <a:cs typeface="Times New Roman" panose="02020603050405020304"/>
+                          <a:cs typeface="Times New Roman" panose="02020503050405090304"/>
                         </a:rPr>
                         <a:t>Variant</a:t>
                       </a:r>
@@ -17904,7 +17954,7 @@
                         </a:solidFill>
                         <a:latin typeface="Calibri"/>
                         <a:ea typeface="Calibri"/>
-                        <a:cs typeface="Times New Roman" panose="02020603050405020304"/>
+                        <a:cs typeface="Times New Roman" panose="02020503050405090304"/>
                       </a:endParaRPr>
                     </a:p>
                   </a:txBody>
@@ -17970,7 +18020,7 @@
                           </a:solidFill>
                           <a:latin typeface="Calibri"/>
                           <a:ea typeface="Calibri"/>
-                          <a:cs typeface="Times New Roman" panose="02020603050405020304"/>
+                          <a:cs typeface="Times New Roman" panose="02020503050405090304"/>
                         </a:rPr>
                         <a:t>GoF</a:t>
                       </a:r>
@@ -17981,7 +18031,7 @@
                           </a:solidFill>
                           <a:latin typeface="Calibri"/>
                           <a:ea typeface="Calibri"/>
-                          <a:cs typeface="Times New Roman" panose="02020603050405020304"/>
+                          <a:cs typeface="Times New Roman" panose="02020503050405090304"/>
                         </a:rPr>
                         <a:t>/</a:t>
                       </a:r>
@@ -17992,7 +18042,7 @@
                           </a:solidFill>
                           <a:latin typeface="Calibri"/>
                           <a:ea typeface="Calibri"/>
-                          <a:cs typeface="Times New Roman" panose="02020603050405020304"/>
+                          <a:cs typeface="Times New Roman" panose="02020503050405090304"/>
                         </a:rPr>
                         <a:t>LoF</a:t>
                       </a:r>
@@ -18002,7 +18052,7 @@
                         </a:solidFill>
                         <a:latin typeface="Calibri"/>
                         <a:ea typeface="Calibri"/>
-                        <a:cs typeface="Times New Roman" panose="02020603050405020304"/>
+                        <a:cs typeface="Times New Roman" panose="02020503050405090304"/>
                       </a:endParaRPr>
                     </a:p>
                   </a:txBody>
@@ -18068,7 +18118,7 @@
                           </a:solidFill>
                           <a:latin typeface="Calibri"/>
                           <a:ea typeface="Calibri"/>
-                          <a:cs typeface="Times New Roman" panose="02020603050405020304"/>
+                          <a:cs typeface="Times New Roman" panose="02020503050405090304"/>
                         </a:rPr>
                         <a:t>Comments</a:t>
                       </a:r>
@@ -18078,7 +18128,7 @@
                         </a:solidFill>
                         <a:latin typeface="Calibri"/>
                         <a:ea typeface="Calibri"/>
-                        <a:cs typeface="Times New Roman" panose="02020603050405020304"/>
+                        <a:cs typeface="Times New Roman" panose="02020503050405090304"/>
                       </a:endParaRPr>
                     </a:p>
                   </a:txBody>
@@ -18144,7 +18194,7 @@
                           </a:solidFill>
                           <a:latin typeface="+mn-lt"/>
                           <a:ea typeface="Calibri"/>
-                          <a:cs typeface="Times New Roman" panose="02020603050405020304"/>
+                          <a:cs typeface="Times New Roman" panose="02020503050405090304"/>
                         </a:rPr>
                         <a:t>XXXX</a:t>
                       </a:r>
@@ -18154,7 +18204,7 @@
                         </a:solidFill>
                         <a:latin typeface="+mn-lt"/>
                         <a:ea typeface="Calibri"/>
-                        <a:cs typeface="Times New Roman" panose="02020603050405020304"/>
+                        <a:cs typeface="Times New Roman" panose="02020503050405090304"/>
                       </a:endParaRPr>
                     </a:p>
                   </a:txBody>
@@ -18195,7 +18245,7 @@
                           </a:solidFill>
                           <a:latin typeface="+mn-lt"/>
                           <a:ea typeface="Calibri"/>
-                          <a:cs typeface="Times New Roman" panose="02020603050405020304"/>
+                          <a:cs typeface="Times New Roman" panose="02020503050405090304"/>
                         </a:rPr>
                         <a:t>xxx</a:t>
                       </a:r>
@@ -18205,7 +18255,7 @@
                         </a:solidFill>
                         <a:latin typeface="+mn-lt"/>
                         <a:ea typeface="Calibri"/>
-                        <a:cs typeface="Times New Roman" panose="02020603050405020304"/>
+                        <a:cs typeface="Times New Roman" panose="02020503050405090304"/>
                       </a:endParaRPr>
                     </a:p>
                   </a:txBody>
@@ -18252,7 +18302,7 @@
                           </a:solidFill>
                           <a:latin typeface="Calibri"/>
                           <a:ea typeface="Calibri"/>
-                          <a:cs typeface="Times New Roman" panose="02020603050405020304"/>
+                          <a:cs typeface="Times New Roman" panose="02020503050405090304"/>
                         </a:rPr>
                         <a:t>LoF</a:t>
                       </a:r>
@@ -18263,7 +18313,7 @@
                           </a:solidFill>
                           <a:latin typeface="Calibri"/>
                           <a:ea typeface="Calibri"/>
-                          <a:cs typeface="Times New Roman" panose="02020603050405020304"/>
+                          <a:cs typeface="Times New Roman" panose="02020503050405090304"/>
                         </a:rPr>
                         <a:t>/</a:t>
                       </a:r>
@@ -18274,7 +18324,7 @@
                           </a:solidFill>
                           <a:latin typeface="Calibri"/>
                           <a:ea typeface="Calibri"/>
-                          <a:cs typeface="Times New Roman" panose="02020603050405020304"/>
+                          <a:cs typeface="Times New Roman" panose="02020503050405090304"/>
                         </a:rPr>
                         <a:t>GoF</a:t>
                       </a:r>
@@ -18284,7 +18334,7 @@
                         </a:solidFill>
                         <a:latin typeface="Calibri"/>
                         <a:ea typeface="Calibri"/>
-                        <a:cs typeface="Times New Roman" panose="02020603050405020304"/>
+                        <a:cs typeface="Times New Roman" panose="02020503050405090304"/>
                       </a:endParaRPr>
                     </a:p>
                   </a:txBody>
@@ -18495,7 +18545,7 @@
               <a:t> </a:t>
             </a:r>
             <a:endParaRPr lang="en-US" sz="1400" b="0" strike="noStrike" spc="-1" dirty="0">
-              <a:latin typeface="Arial" panose="020B0604020202020204"/>
+              <a:latin typeface="Arial" panose="020B0604020202090204"/>
             </a:endParaRPr>
           </a:p>
         </p:txBody>
@@ -18561,7 +18611,7 @@
               <a:t> </a:t>
             </a:r>
             <a:endParaRPr lang="en-US" sz="1400" b="0" strike="noStrike" spc="-1" dirty="0">
-              <a:latin typeface="Arial" panose="020B0604020202020204"/>
+              <a:latin typeface="Arial" panose="020B0604020202090204"/>
             </a:endParaRPr>
           </a:p>
         </p:txBody>
@@ -18627,7 +18677,7 @@
               <a:t> </a:t>
             </a:r>
             <a:endParaRPr lang="en-US" sz="1400" b="0" strike="noStrike" spc="-1">
-              <a:latin typeface="Arial" panose="020B0604020202020204"/>
+              <a:latin typeface="Arial" panose="020B0604020202090204"/>
             </a:endParaRPr>
           </a:p>
         </p:txBody>
@@ -18835,7 +18885,7 @@
               <a:t>xx</a:t>
             </a:r>
             <a:endParaRPr lang="en-US" sz="1800" b="0" strike="noStrike" spc="-1" dirty="0">
-              <a:latin typeface="Arial" panose="020B0604020202020204"/>
+              <a:latin typeface="Arial" panose="020B0604020202090204"/>
             </a:endParaRPr>
           </a:p>
           <a:p>
@@ -18854,7 +18904,7 @@
               <a:t>XXX</a:t>
             </a:r>
             <a:endParaRPr lang="en-US" sz="1200" b="0" strike="noStrike" spc="-1" dirty="0">
-              <a:latin typeface="Arial" panose="020B0604020202020204"/>
+              <a:latin typeface="Arial" panose="020B0604020202090204"/>
             </a:endParaRPr>
           </a:p>
           <a:p>
@@ -18879,7 +18929,7 @@
                 </a:solidFill>
                 <a:latin typeface="Calibri"/>
               </a:rPr>
-              <a:t>4</a:t>
+              <a:t>5</a:t>
             </a:r>
             <a:endParaRPr lang="nb-NO" altLang="en-US" sz="800" b="0" strike="noStrike" spc="-1" dirty="0" smtClean="0">
               <a:solidFill>
@@ -18942,7 +18992,7 @@
               <a:t>MDT</a:t>
             </a:r>
             <a:endParaRPr lang="en-US" sz="1400" b="0" strike="noStrike" spc="-1" dirty="0">
-              <a:latin typeface="Arial" panose="020B0604020202020204"/>
+              <a:latin typeface="Arial" panose="020B0604020202090204"/>
             </a:endParaRPr>
           </a:p>
         </p:txBody>
@@ -19137,7 +19187,7 @@
               <a:t>Patient</a:t>
             </a:r>
             <a:endParaRPr lang="en-US" sz="1000" b="0" strike="noStrike" spc="-1">
-              <a:latin typeface="Arial" panose="020B0604020202020204"/>
+              <a:latin typeface="Arial" panose="020B0604020202090204"/>
             </a:endParaRPr>
           </a:p>
         </p:txBody>
@@ -19335,7 +19385,7 @@
               <a:t>Y of D: </a:t>
             </a:r>
             <a:endParaRPr lang="en-US" sz="800" b="0" strike="noStrike" spc="-1">
-              <a:latin typeface="Arial" panose="020B0604020202020204"/>
+              <a:latin typeface="Arial" panose="020B0604020202090204"/>
             </a:endParaRPr>
           </a:p>
         </p:txBody>
@@ -19441,7 +19491,7 @@
               <a:t>Bio-material</a:t>
             </a:r>
             <a:endParaRPr lang="en-US" sz="1000" b="0" strike="noStrike" spc="-1">
-              <a:latin typeface="Arial" panose="020B0604020202020204"/>
+              <a:latin typeface="Arial" panose="020B0604020202090204"/>
             </a:endParaRPr>
           </a:p>
         </p:txBody>
@@ -19547,7 +19597,7 @@
               <a:t>Tumor content</a:t>
             </a:r>
             <a:endParaRPr lang="en-US" sz="1000" b="0" strike="noStrike" spc="-1" dirty="0">
-              <a:latin typeface="Arial" panose="020B0604020202020204"/>
+              <a:latin typeface="Arial" panose="020B0604020202090204"/>
             </a:endParaRPr>
           </a:p>
         </p:txBody>
@@ -19733,7 +19783,7 @@
               <a:solidFill>
                 <a:schemeClr val="bg1"/>
               </a:solidFill>
-              <a:latin typeface="Arial" panose="020B0604020202020204"/>
+              <a:latin typeface="Arial" panose="020B0604020202090204"/>
             </a:endParaRPr>
           </a:p>
           <a:p>
@@ -19755,7 +19805,7 @@
               <a:solidFill>
                 <a:schemeClr val="bg1"/>
               </a:solidFill>
-              <a:latin typeface="Arial" panose="020B0604020202020204"/>
+              <a:latin typeface="Arial" panose="020B0604020202090204"/>
             </a:endParaRPr>
           </a:p>
         </p:txBody>
@@ -20012,8 +20062,8 @@
                         <a:t> relevant for immune therapy</a:t>
                       </a:r>
                       <a:endParaRPr lang="en-US" sz="800" b="1" dirty="0">
-                        <a:latin typeface="Times New Roman" panose="02020603050405020304"/>
-                        <a:ea typeface="Times New Roman" panose="02020603050405020304"/>
+                        <a:latin typeface="Times New Roman" panose="02020503050405090304"/>
+                        <a:ea typeface="Times New Roman" panose="02020503050405090304"/>
                       </a:endParaRPr>
                     </a:p>
                   </a:txBody>
@@ -20045,8 +20095,8 @@
                         <a:defRPr/>
                       </a:pPr>
                       <a:endParaRPr lang="en-US" sz="600" dirty="0" smtClean="0">
-                        <a:latin typeface="Times New Roman" panose="02020603050405020304"/>
-                        <a:ea typeface="Times New Roman" panose="02020603050405020304"/>
+                        <a:latin typeface="Times New Roman" panose="02020503050405090304"/>
+                        <a:ea typeface="Times New Roman" panose="02020503050405090304"/>
                       </a:endParaRPr>
                     </a:p>
                     <a:p>
@@ -20069,13 +20119,13 @@
                       <a:r>
                         <a:rPr lang="en-US" sz="800" dirty="0" smtClean="0">
                           <a:latin typeface="+mn-lt"/>
-                          <a:ea typeface="Times New Roman" panose="02020603050405020304"/>
+                          <a:ea typeface="Times New Roman" panose="02020503050405090304"/>
                         </a:rPr>
                         <a:t>None reported</a:t>
                       </a:r>
                       <a:endParaRPr lang="en-US" sz="800" dirty="0" smtClean="0">
                         <a:latin typeface="+mn-lt"/>
-                        <a:ea typeface="Times New Roman" panose="02020603050405020304"/>
+                        <a:ea typeface="Times New Roman" panose="02020503050405090304"/>
                       </a:endParaRPr>
                     </a:p>
                   </a:txBody>
@@ -20148,7 +20198,7 @@
                           </a:solidFill>
                           <a:latin typeface="Calibri"/>
                           <a:ea typeface="Calibri"/>
-                          <a:cs typeface="Times New Roman" panose="02020603050405020304"/>
+                          <a:cs typeface="Times New Roman" panose="02020503050405090304"/>
                         </a:rPr>
                         <a:t>Gene</a:t>
                       </a:r>
@@ -20158,7 +20208,7 @@
                         </a:solidFill>
                         <a:latin typeface="Calibri"/>
                         <a:ea typeface="Calibri"/>
-                        <a:cs typeface="Times New Roman" panose="02020603050405020304"/>
+                        <a:cs typeface="Times New Roman" panose="02020503050405090304"/>
                       </a:endParaRPr>
                     </a:p>
                   </a:txBody>
@@ -20215,7 +20265,7 @@
                           </a:solidFill>
                           <a:latin typeface="Calibri"/>
                           <a:ea typeface="Calibri"/>
-                          <a:cs typeface="Times New Roman" panose="02020603050405020304"/>
+                          <a:cs typeface="Times New Roman" panose="02020503050405090304"/>
                         </a:rPr>
                         <a:t>Variant</a:t>
                       </a:r>
@@ -20225,7 +20275,7 @@
                         </a:solidFill>
                         <a:latin typeface="Calibri"/>
                         <a:ea typeface="Calibri"/>
-                        <a:cs typeface="Times New Roman" panose="02020603050405020304"/>
+                        <a:cs typeface="Times New Roman" panose="02020503050405090304"/>
                       </a:endParaRPr>
                     </a:p>
                   </a:txBody>
@@ -20288,7 +20338,7 @@
                           </a:solidFill>
                           <a:latin typeface="Calibri"/>
                           <a:ea typeface="Calibri"/>
-                          <a:cs typeface="Times New Roman" panose="02020603050405020304"/>
+                          <a:cs typeface="Times New Roman" panose="02020503050405090304"/>
                         </a:rPr>
                         <a:t>Type</a:t>
                       </a:r>
@@ -20298,7 +20348,7 @@
                         </a:solidFill>
                         <a:latin typeface="Calibri"/>
                         <a:ea typeface="Calibri"/>
-                        <a:cs typeface="Times New Roman" panose="02020603050405020304"/>
+                        <a:cs typeface="Times New Roman" panose="02020503050405090304"/>
                       </a:endParaRPr>
                     </a:p>
                   </a:txBody>
@@ -20361,7 +20411,7 @@
                           </a:solidFill>
                           <a:latin typeface="Calibri"/>
                           <a:ea typeface="Calibri"/>
-                          <a:cs typeface="Times New Roman" panose="02020603050405020304"/>
+                          <a:cs typeface="Times New Roman" panose="02020503050405090304"/>
                         </a:rPr>
                         <a:t>VAF</a:t>
                       </a:r>
@@ -20372,7 +20422,7 @@
                           </a:solidFill>
                           <a:latin typeface="Calibri"/>
                           <a:ea typeface="Calibri"/>
-                          <a:cs typeface="Times New Roman" panose="02020603050405020304"/>
+                          <a:cs typeface="Times New Roman" panose="02020503050405090304"/>
                         </a:rPr>
                         <a:t>/</a:t>
                       </a:r>
@@ -20382,7 +20432,7 @@
                         </a:solidFill>
                         <a:latin typeface="Calibri"/>
                         <a:ea typeface="Calibri"/>
-                        <a:cs typeface="Times New Roman" panose="02020603050405020304"/>
+                        <a:cs typeface="Times New Roman" panose="02020503050405090304"/>
                       </a:endParaRPr>
                     </a:p>
                     <a:p>
@@ -20404,7 +20454,7 @@
                           </a:solidFill>
                           <a:latin typeface="Calibri"/>
                           <a:ea typeface="Calibri"/>
-                          <a:cs typeface="Times New Roman" panose="02020603050405020304"/>
+                          <a:cs typeface="Times New Roman" panose="02020503050405090304"/>
                         </a:rPr>
                         <a:t>CN </a:t>
                       </a:r>
@@ -20414,7 +20464,7 @@
                         </a:solidFill>
                         <a:latin typeface="Calibri"/>
                         <a:ea typeface="Calibri"/>
-                        <a:cs typeface="Times New Roman" panose="02020603050405020304"/>
+                        <a:cs typeface="Times New Roman" panose="02020503050405090304"/>
                       </a:endParaRPr>
                     </a:p>
                   </a:txBody>
@@ -20477,7 +20527,7 @@
                           </a:solidFill>
                           <a:latin typeface="Calibri"/>
                           <a:ea typeface="Calibri"/>
-                          <a:cs typeface="Times New Roman" panose="02020603050405020304"/>
+                          <a:cs typeface="Times New Roman" panose="02020503050405090304"/>
                         </a:rPr>
                         <a:t>Variant</a:t>
                       </a:r>
@@ -20487,7 +20537,7 @@
                         </a:solidFill>
                         <a:latin typeface="Calibri"/>
                         <a:ea typeface="Calibri"/>
-                        <a:cs typeface="Times New Roman" panose="02020603050405020304"/>
+                        <a:cs typeface="Times New Roman" panose="02020503050405090304"/>
                       </a:endParaRPr>
                     </a:p>
                     <a:p>
@@ -20509,7 +20559,7 @@
                           </a:solidFill>
                           <a:latin typeface="Calibri"/>
                           <a:ea typeface="Calibri"/>
-                          <a:cs typeface="Times New Roman" panose="02020603050405020304"/>
+                          <a:cs typeface="Times New Roman" panose="02020503050405090304"/>
                         </a:rPr>
                         <a:t>GoF/</a:t>
                       </a:r>
@@ -20519,7 +20569,7 @@
                         </a:solidFill>
                         <a:latin typeface="Calibri"/>
                         <a:ea typeface="Calibri"/>
-                        <a:cs typeface="Times New Roman" panose="02020603050405020304"/>
+                        <a:cs typeface="Times New Roman" panose="02020503050405090304"/>
                       </a:endParaRPr>
                     </a:p>
                     <a:p>
@@ -20541,7 +20591,7 @@
                           </a:solidFill>
                           <a:latin typeface="Calibri"/>
                           <a:ea typeface="Calibri"/>
-                          <a:cs typeface="Times New Roman" panose="02020603050405020304"/>
+                          <a:cs typeface="Times New Roman" panose="02020503050405090304"/>
                         </a:rPr>
                         <a:t>LoF</a:t>
                       </a:r>
@@ -20551,7 +20601,7 @@
                         </a:solidFill>
                         <a:latin typeface="Calibri"/>
                         <a:ea typeface="Calibri"/>
-                        <a:cs typeface="Times New Roman" panose="02020603050405020304"/>
+                        <a:cs typeface="Times New Roman" panose="02020503050405090304"/>
                       </a:endParaRPr>
                     </a:p>
                   </a:txBody>
@@ -20614,7 +20664,7 @@
                           </a:solidFill>
                           <a:latin typeface="Calibri"/>
                           <a:ea typeface="Calibri"/>
-                          <a:cs typeface="Times New Roman" panose="02020603050405020304"/>
+                          <a:cs typeface="Times New Roman" panose="02020503050405090304"/>
                         </a:rPr>
                         <a:t>Pathway</a:t>
                       </a:r>
@@ -20625,7 +20675,7 @@
                           </a:solidFill>
                           <a:latin typeface="Calibri"/>
                           <a:ea typeface="Calibri"/>
-                          <a:cs typeface="Times New Roman" panose="02020603050405020304"/>
+                          <a:cs typeface="Times New Roman" panose="02020503050405090304"/>
                         </a:rPr>
                         <a:t>/</a:t>
                       </a:r>
@@ -20635,7 +20685,7 @@
                         </a:solidFill>
                         <a:latin typeface="Calibri"/>
                         <a:ea typeface="Calibri"/>
-                        <a:cs typeface="Times New Roman" panose="02020603050405020304"/>
+                        <a:cs typeface="Times New Roman" panose="02020503050405090304"/>
                       </a:endParaRPr>
                     </a:p>
                     <a:p>
@@ -20657,7 +20707,7 @@
                           </a:solidFill>
                           <a:latin typeface="Calibri"/>
                           <a:ea typeface="Calibri"/>
-                          <a:cs typeface="Times New Roman" panose="02020603050405020304"/>
+                          <a:cs typeface="Times New Roman" panose="02020503050405090304"/>
                         </a:rPr>
                         <a:t>function</a:t>
                       </a:r>
@@ -20667,7 +20717,7 @@
                         </a:solidFill>
                         <a:latin typeface="Calibri"/>
                         <a:ea typeface="Calibri"/>
-                        <a:cs typeface="Times New Roman" panose="02020603050405020304"/>
+                        <a:cs typeface="Times New Roman" panose="02020503050405090304"/>
                       </a:endParaRPr>
                     </a:p>
                   </a:txBody>
@@ -20730,7 +20780,7 @@
                           </a:solidFill>
                           <a:latin typeface="Calibri"/>
                           <a:ea typeface="Calibri"/>
-                          <a:cs typeface="Times New Roman" panose="02020603050405020304"/>
+                          <a:cs typeface="Times New Roman" panose="02020503050405090304"/>
                         </a:rPr>
                         <a:t>Therapeutic context</a:t>
                       </a:r>
@@ -20740,7 +20790,7 @@
                         </a:solidFill>
                         <a:latin typeface="Calibri"/>
                         <a:ea typeface="Calibri"/>
-                        <a:cs typeface="Times New Roman" panose="02020603050405020304"/>
+                        <a:cs typeface="Times New Roman" panose="02020503050405090304"/>
                       </a:endParaRPr>
                     </a:p>
                   </a:txBody>
@@ -20812,7 +20862,7 @@
                           </a:solidFill>
                           <a:latin typeface="Calibri"/>
                           <a:ea typeface="Calibri"/>
-                          <a:cs typeface="Times New Roman" panose="02020603050405020304"/>
+                          <a:cs typeface="Times New Roman" panose="02020503050405090304"/>
                         </a:rPr>
                         <a:t>Level of Evidence</a:t>
                       </a:r>
@@ -20822,7 +20872,7 @@
                         </a:solidFill>
                         <a:latin typeface="Calibri"/>
                         <a:ea typeface="Calibri"/>
-                        <a:cs typeface="Times New Roman" panose="02020603050405020304"/>
+                        <a:cs typeface="Times New Roman" panose="02020503050405090304"/>
                       </a:endParaRPr>
                     </a:p>
                   </a:txBody>
@@ -20911,7 +20961,7 @@
                           </a:solidFill>
                           <a:latin typeface="Calibri"/>
                           <a:ea typeface="Calibri"/>
-                          <a:cs typeface="Times New Roman" panose="02020603050405020304"/>
+                          <a:cs typeface="Times New Roman" panose="02020503050405090304"/>
                         </a:rPr>
                         <a:t>Sensitive</a:t>
                       </a:r>
@@ -20921,7 +20971,7 @@
                         </a:solidFill>
                         <a:latin typeface="Calibri"/>
                         <a:ea typeface="Calibri"/>
-                        <a:cs typeface="Times New Roman" panose="02020603050405020304"/>
+                        <a:cs typeface="Times New Roman" panose="02020503050405090304"/>
                       </a:endParaRPr>
                     </a:p>
                   </a:txBody>
@@ -20978,7 +21028,7 @@
                           </a:solidFill>
                           <a:latin typeface="Calibri"/>
                           <a:ea typeface="Calibri"/>
-                          <a:cs typeface="Times New Roman" panose="02020603050405020304"/>
+                          <a:cs typeface="Times New Roman" panose="02020503050405090304"/>
                         </a:rPr>
                         <a:t>Resistant</a:t>
                       </a:r>
@@ -20988,7 +21038,7 @@
                         </a:solidFill>
                         <a:latin typeface="Calibri"/>
                         <a:ea typeface="Calibri"/>
-                        <a:cs typeface="Times New Roman" panose="02020603050405020304"/>
+                        <a:cs typeface="Times New Roman" panose="02020503050405090304"/>
                       </a:endParaRPr>
                     </a:p>
                   </a:txBody>
@@ -21045,7 +21095,7 @@
                           </a:solidFill>
                           <a:latin typeface="Calibri"/>
                           <a:ea typeface="Calibri"/>
-                          <a:cs typeface="Times New Roman" panose="02020603050405020304"/>
+                          <a:cs typeface="Times New Roman" panose="02020503050405090304"/>
                         </a:rPr>
                         <a:t>Patient’s </a:t>
                       </a:r>
@@ -21056,7 +21106,7 @@
                           </a:solidFill>
                           <a:latin typeface="Calibri"/>
                           <a:ea typeface="Calibri"/>
-                          <a:cs typeface="Times New Roman" panose="02020603050405020304"/>
+                          <a:cs typeface="Times New Roman" panose="02020503050405090304"/>
                         </a:rPr>
                         <a:t>tumor type</a:t>
                       </a:r>
@@ -21066,7 +21116,7 @@
                         </a:solidFill>
                         <a:latin typeface="Calibri"/>
                         <a:ea typeface="Calibri"/>
-                        <a:cs typeface="Times New Roman" panose="02020603050405020304"/>
+                        <a:cs typeface="Times New Roman" panose="02020503050405090304"/>
                       </a:endParaRPr>
                     </a:p>
                   </a:txBody>
@@ -21123,7 +21173,7 @@
                           </a:solidFill>
                           <a:latin typeface="Calibri"/>
                           <a:ea typeface="Calibri"/>
-                          <a:cs typeface="Times New Roman" panose="02020603050405020304"/>
+                          <a:cs typeface="Times New Roman" panose="02020503050405090304"/>
                         </a:rPr>
                         <a:t>Other tumor type</a:t>
                       </a:r>
@@ -21133,7 +21183,7 @@
                         </a:solidFill>
                         <a:latin typeface="Calibri"/>
                         <a:ea typeface="Calibri"/>
-                        <a:cs typeface="Times New Roman" panose="02020603050405020304"/>
+                        <a:cs typeface="Times New Roman" panose="02020503050405090304"/>
                       </a:endParaRPr>
                     </a:p>
                   </a:txBody>
@@ -21186,7 +21236,7 @@
                           </a:solidFill>
                           <a:latin typeface="Calibri"/>
                           <a:ea typeface="Calibri"/>
-                          <a:cs typeface="Times New Roman" panose="02020603050405020304"/>
+                          <a:cs typeface="Times New Roman" panose="02020503050405090304"/>
                         </a:rPr>
                         <a:t>--</a:t>
                       </a:r>
@@ -21196,7 +21246,7 @@
                         </a:solidFill>
                         <a:latin typeface="Calibri"/>
                         <a:ea typeface="Calibri"/>
-                        <a:cs typeface="Times New Roman" panose="02020603050405020304"/>
+                        <a:cs typeface="Times New Roman" panose="02020503050405090304"/>
                       </a:endParaRPr>
                     </a:p>
                   </a:txBody>
@@ -21242,7 +21292,7 @@
                         </a:solidFill>
                         <a:latin typeface="Calibri"/>
                         <a:ea typeface="Calibri"/>
-                        <a:cs typeface="Times New Roman" panose="02020603050405020304"/>
+                        <a:cs typeface="Times New Roman" panose="02020503050405090304"/>
                       </a:endParaRPr>
                     </a:p>
                     <a:p>
@@ -21263,7 +21313,7 @@
                         </a:solidFill>
                         <a:latin typeface="Calibri"/>
                         <a:ea typeface="Calibri"/>
-                        <a:cs typeface="Times New Roman" panose="02020603050405020304"/>
+                        <a:cs typeface="Times New Roman" panose="02020503050405090304"/>
                       </a:endParaRPr>
                     </a:p>
                   </a:txBody>
@@ -21309,7 +21359,7 @@
                         </a:solidFill>
                         <a:latin typeface="Calibri"/>
                         <a:ea typeface="Calibri"/>
-                        <a:cs typeface="Times New Roman" panose="02020603050405020304"/>
+                        <a:cs typeface="Times New Roman" panose="02020503050405090304"/>
                       </a:endParaRPr>
                     </a:p>
                   </a:txBody>
@@ -21355,7 +21405,7 @@
                         </a:solidFill>
                         <a:latin typeface="Calibri"/>
                         <a:ea typeface="Calibri"/>
-                        <a:cs typeface="Times New Roman" panose="02020603050405020304"/>
+                        <a:cs typeface="Times New Roman" panose="02020503050405090304"/>
                       </a:endParaRPr>
                     </a:p>
                   </a:txBody>
@@ -21401,7 +21451,7 @@
                         </a:solidFill>
                         <a:latin typeface="Calibri"/>
                         <a:ea typeface="Calibri"/>
-                        <a:cs typeface="Times New Roman" panose="02020603050405020304"/>
+                        <a:cs typeface="Times New Roman" panose="02020503050405090304"/>
                       </a:endParaRPr>
                     </a:p>
                   </a:txBody>
@@ -21447,7 +21497,7 @@
                         </a:solidFill>
                         <a:latin typeface="Calibri"/>
                         <a:ea typeface="Calibri"/>
-                        <a:cs typeface="Times New Roman" panose="02020603050405020304"/>
+                        <a:cs typeface="Times New Roman" panose="02020503050405090304"/>
                       </a:endParaRPr>
                     </a:p>
                   </a:txBody>
@@ -21493,7 +21543,7 @@
                         </a:solidFill>
                         <a:latin typeface="Calibri"/>
                         <a:ea typeface="Calibri"/>
-                        <a:cs typeface="Times New Roman" panose="02020603050405020304"/>
+                        <a:cs typeface="Times New Roman" panose="02020503050405090304"/>
                       </a:endParaRPr>
                     </a:p>
                   </a:txBody>
@@ -21577,7 +21627,7 @@
                         </a:solidFill>
                         <a:latin typeface="Calibri"/>
                         <a:ea typeface="Calibri"/>
-                        <a:cs typeface="Times New Roman" panose="02020603050405020304"/>
+                        <a:cs typeface="Times New Roman" panose="02020503050405090304"/>
                       </a:endParaRPr>
                     </a:p>
                   </a:txBody>
@@ -21623,7 +21673,7 @@
                         </a:solidFill>
                         <a:latin typeface="Calibri"/>
                         <a:ea typeface="Calibri"/>
-                        <a:cs typeface="Times New Roman" panose="02020603050405020304"/>
+                        <a:cs typeface="Times New Roman" panose="02020503050405090304"/>
                       </a:endParaRPr>
                     </a:p>
                   </a:txBody>
@@ -21672,7 +21722,7 @@
                           </a:solidFill>
                           <a:latin typeface="Calibri"/>
                           <a:ea typeface="Calibri"/>
-                          <a:cs typeface="Times New Roman" panose="02020603050405020304"/>
+                          <a:cs typeface="Times New Roman" panose="02020503050405090304"/>
                         </a:rPr>
                         <a:t>Variant classification </a:t>
                       </a:r>
@@ -21682,7 +21732,7 @@
                         </a:solidFill>
                         <a:latin typeface="Calibri"/>
                         <a:ea typeface="Calibri"/>
-                        <a:cs typeface="Times New Roman" panose="02020603050405020304"/>
+                        <a:cs typeface="Times New Roman" panose="02020503050405090304"/>
                       </a:endParaRPr>
                     </a:p>
                   </a:txBody>
@@ -21779,7 +21829,7 @@
                         </a:solidFill>
                         <a:latin typeface="+mn-lt"/>
                         <a:ea typeface="Calibri"/>
-                        <a:cs typeface="Times New Roman" panose="02020603050405020304"/>
+                        <a:cs typeface="Times New Roman" panose="02020503050405090304"/>
                       </a:endParaRPr>
                     </a:p>
                   </a:txBody>
@@ -22182,7 +22232,7 @@
                   <a:srgbClr val="000000"/>
                 </a:solidFill>
                 <a:ea typeface="Calibri"/>
-                <a:cs typeface="Times New Roman" panose="02020603050405020304"/>
+                <a:cs typeface="Times New Roman" panose="02020503050405090304"/>
               </a:rPr>
               <a:t>Mutation hotspot</a:t>
             </a:r>
@@ -22406,7 +22456,7 @@
                           </a:solidFill>
                           <a:latin typeface="Calibri"/>
                           <a:ea typeface="Calibri"/>
-                          <a:cs typeface="Times New Roman" panose="02020603050405020304"/>
+                          <a:cs typeface="Times New Roman" panose="02020503050405090304"/>
                         </a:rPr>
                         <a:t>Gene</a:t>
                       </a:r>
@@ -22416,7 +22466,7 @@
                         </a:solidFill>
                         <a:latin typeface="Calibri"/>
                         <a:ea typeface="Calibri"/>
-                        <a:cs typeface="Times New Roman" panose="02020603050405020304"/>
+                        <a:cs typeface="Times New Roman" panose="02020503050405090304"/>
                       </a:endParaRPr>
                     </a:p>
                   </a:txBody>
@@ -22476,7 +22526,7 @@
                           </a:solidFill>
                           <a:latin typeface="Calibri"/>
                           <a:ea typeface="Calibri"/>
-                          <a:cs typeface="Times New Roman" panose="02020603050405020304"/>
+                          <a:cs typeface="Times New Roman" panose="02020503050405090304"/>
                         </a:rPr>
                         <a:t>Variant</a:t>
                       </a:r>
@@ -22486,7 +22536,7 @@
                         </a:solidFill>
                         <a:latin typeface="Calibri"/>
                         <a:ea typeface="Calibri"/>
-                        <a:cs typeface="Times New Roman" panose="02020603050405020304"/>
+                        <a:cs typeface="Times New Roman" panose="02020503050405090304"/>
                       </a:endParaRPr>
                     </a:p>
                   </a:txBody>
@@ -22552,7 +22602,7 @@
                           </a:solidFill>
                           <a:latin typeface="Calibri"/>
                           <a:ea typeface="Calibri"/>
-                          <a:cs typeface="Times New Roman" panose="02020603050405020304"/>
+                          <a:cs typeface="Times New Roman" panose="02020503050405090304"/>
                         </a:rPr>
                         <a:t>GoF</a:t>
                       </a:r>
@@ -22563,7 +22613,7 @@
                           </a:solidFill>
                           <a:latin typeface="Calibri"/>
                           <a:ea typeface="Calibri"/>
-                          <a:cs typeface="Times New Roman" panose="02020603050405020304"/>
+                          <a:cs typeface="Times New Roman" panose="02020503050405090304"/>
                         </a:rPr>
                         <a:t>/</a:t>
                       </a:r>
@@ -22574,7 +22624,7 @@
                           </a:solidFill>
                           <a:latin typeface="Calibri"/>
                           <a:ea typeface="Calibri"/>
-                          <a:cs typeface="Times New Roman" panose="02020603050405020304"/>
+                          <a:cs typeface="Times New Roman" panose="02020503050405090304"/>
                         </a:rPr>
                         <a:t>LoF</a:t>
                       </a:r>
@@ -22584,7 +22634,7 @@
                         </a:solidFill>
                         <a:latin typeface="Calibri"/>
                         <a:ea typeface="Calibri"/>
-                        <a:cs typeface="Times New Roman" panose="02020603050405020304"/>
+                        <a:cs typeface="Times New Roman" panose="02020503050405090304"/>
                       </a:endParaRPr>
                     </a:p>
                   </a:txBody>
@@ -22650,7 +22700,7 @@
                           </a:solidFill>
                           <a:latin typeface="Calibri"/>
                           <a:ea typeface="Calibri"/>
-                          <a:cs typeface="Times New Roman" panose="02020603050405020304"/>
+                          <a:cs typeface="Times New Roman" panose="02020503050405090304"/>
                         </a:rPr>
                         <a:t>Comments</a:t>
                       </a:r>
@@ -22660,7 +22710,7 @@
                         </a:solidFill>
                         <a:latin typeface="Calibri"/>
                         <a:ea typeface="Calibri"/>
-                        <a:cs typeface="Times New Roman" panose="02020603050405020304"/>
+                        <a:cs typeface="Times New Roman" panose="02020503050405090304"/>
                       </a:endParaRPr>
                     </a:p>
                   </a:txBody>
@@ -22726,7 +22776,7 @@
                           </a:solidFill>
                           <a:latin typeface="+mn-lt"/>
                           <a:ea typeface="Calibri"/>
-                          <a:cs typeface="Times New Roman" panose="02020603050405020304"/>
+                          <a:cs typeface="Times New Roman" panose="02020503050405090304"/>
                         </a:rPr>
                         <a:t>XX</a:t>
                       </a:r>
@@ -22736,7 +22786,7 @@
                         </a:solidFill>
                         <a:latin typeface="+mn-lt"/>
                         <a:ea typeface="Calibri"/>
-                        <a:cs typeface="Times New Roman" panose="02020603050405020304"/>
+                        <a:cs typeface="Times New Roman" panose="02020503050405090304"/>
                       </a:endParaRPr>
                     </a:p>
                   </a:txBody>
@@ -22777,7 +22827,7 @@
                           </a:solidFill>
                           <a:latin typeface="+mn-lt"/>
                           <a:ea typeface="Calibri"/>
-                          <a:cs typeface="Times New Roman" panose="02020603050405020304"/>
+                          <a:cs typeface="Times New Roman" panose="02020503050405090304"/>
                         </a:rPr>
                         <a:t>xx</a:t>
                       </a:r>
@@ -22787,7 +22837,7 @@
                         </a:solidFill>
                         <a:latin typeface="+mn-lt"/>
                         <a:ea typeface="Calibri"/>
-                        <a:cs typeface="Times New Roman" panose="02020603050405020304"/>
+                        <a:cs typeface="Times New Roman" panose="02020503050405090304"/>
                       </a:endParaRPr>
                     </a:p>
                   </a:txBody>
@@ -22834,7 +22884,7 @@
                           </a:solidFill>
                           <a:latin typeface="Calibri"/>
                           <a:ea typeface="Calibri"/>
-                          <a:cs typeface="Times New Roman" panose="02020603050405020304"/>
+                          <a:cs typeface="Times New Roman" panose="02020503050405090304"/>
                         </a:rPr>
                         <a:t>LoF</a:t>
                       </a:r>
@@ -22845,7 +22895,7 @@
                           </a:solidFill>
                           <a:latin typeface="Calibri"/>
                           <a:ea typeface="Calibri"/>
-                          <a:cs typeface="Times New Roman" panose="02020603050405020304"/>
+                          <a:cs typeface="Times New Roman" panose="02020503050405090304"/>
                         </a:rPr>
                         <a:t>/</a:t>
                       </a:r>
@@ -22856,7 +22906,7 @@
                           </a:solidFill>
                           <a:latin typeface="Calibri"/>
                           <a:ea typeface="Calibri"/>
-                          <a:cs typeface="Times New Roman" panose="02020603050405020304"/>
+                          <a:cs typeface="Times New Roman" panose="02020503050405090304"/>
                         </a:rPr>
                         <a:t>GoF</a:t>
                       </a:r>
@@ -22866,7 +22916,7 @@
                         </a:solidFill>
                         <a:latin typeface="Calibri"/>
                         <a:ea typeface="Calibri"/>
-                        <a:cs typeface="Times New Roman" panose="02020603050405020304"/>
+                        <a:cs typeface="Times New Roman" panose="02020503050405090304"/>
                       </a:endParaRPr>
                     </a:p>
                     <a:p>
@@ -22888,7 +22938,7 @@
                           </a:solidFill>
                           <a:latin typeface="Calibri"/>
                           <a:ea typeface="Calibri"/>
-                          <a:cs typeface="Times New Roman" panose="02020603050405020304"/>
+                          <a:cs typeface="Times New Roman" panose="02020503050405090304"/>
                         </a:rPr>
                         <a:t>Unknown</a:t>
                       </a:r>
@@ -22898,7 +22948,7 @@
                         </a:solidFill>
                         <a:latin typeface="Calibri"/>
                         <a:ea typeface="Calibri"/>
-                        <a:cs typeface="Times New Roman" panose="02020603050405020304"/>
+                        <a:cs typeface="Times New Roman" panose="02020503050405090304"/>
                       </a:endParaRPr>
                     </a:p>
                   </a:txBody>
@@ -23065,7 +23115,7 @@
                         <a:effectLst/>
                         <a:latin typeface="Calibri" panose="020F0502020204030204" pitchFamily="34" charset="0"/>
                         <a:ea typeface="Calibri" panose="020F0502020204030204" pitchFamily="34" charset="0"/>
-                        <a:cs typeface="Times New Roman" panose="02020603050405020304" pitchFamily="18" charset="0"/>
+                        <a:cs typeface="Times New Roman" panose="02020503050405090304" pitchFamily="18" charset="0"/>
                       </a:endParaRPr>
                     </a:p>
                   </a:txBody>
@@ -23094,7 +23144,7 @@
                         <a:effectLst/>
                         <a:latin typeface="Calibri" panose="020F0502020204030204" pitchFamily="34" charset="0"/>
                         <a:ea typeface="Calibri" panose="020F0502020204030204" pitchFamily="34" charset="0"/>
-                        <a:cs typeface="Times New Roman" panose="02020603050405020304" pitchFamily="18" charset="0"/>
+                        <a:cs typeface="Times New Roman" panose="02020503050405090304" pitchFamily="18" charset="0"/>
                       </a:endParaRPr>
                     </a:p>
                   </a:txBody>
@@ -23129,7 +23179,7 @@
                         <a:effectLst/>
                         <a:latin typeface="Calibri" panose="020F0502020204030204" pitchFamily="34" charset="0"/>
                         <a:ea typeface="Calibri" panose="020F0502020204030204" pitchFamily="34" charset="0"/>
-                        <a:cs typeface="Times New Roman" panose="02020603050405020304" pitchFamily="18" charset="0"/>
+                        <a:cs typeface="Times New Roman" panose="02020503050405090304" pitchFamily="18" charset="0"/>
                       </a:endParaRPr>
                     </a:p>
                   </a:txBody>
@@ -23164,7 +23214,7 @@
                         <a:effectLst/>
                         <a:latin typeface="Calibri" panose="020F0502020204030204" pitchFamily="34" charset="0"/>
                         <a:ea typeface="Calibri" panose="020F0502020204030204" pitchFamily="34" charset="0"/>
-                        <a:cs typeface="Times New Roman" panose="02020603050405020304" pitchFamily="18" charset="0"/>
+                        <a:cs typeface="Times New Roman" panose="02020503050405090304" pitchFamily="18" charset="0"/>
                       </a:endParaRPr>
                     </a:p>
                   </a:txBody>
@@ -23205,7 +23255,7 @@
                         <a:effectLst/>
                         <a:latin typeface="Calibri" panose="020F0502020204030204" pitchFamily="34" charset="0"/>
                         <a:ea typeface="Calibri" panose="020F0502020204030204" pitchFamily="34" charset="0"/>
-                        <a:cs typeface="Times New Roman" panose="02020603050405020304" pitchFamily="18" charset="0"/>
+                        <a:cs typeface="Times New Roman" panose="02020503050405090304" pitchFamily="18" charset="0"/>
                       </a:endParaRPr>
                     </a:p>
                   </a:txBody>
@@ -23343,7 +23393,7 @@
                         <a:effectLst/>
                         <a:latin typeface="Calibri" panose="020F0502020204030204" pitchFamily="34" charset="0"/>
                         <a:ea typeface="Calibri" panose="020F0502020204030204" pitchFamily="34" charset="0"/>
-                        <a:cs typeface="Times New Roman" panose="02020603050405020304" pitchFamily="18" charset="0"/>
+                        <a:cs typeface="Times New Roman" panose="02020503050405090304" pitchFamily="18" charset="0"/>
                       </a:endParaRPr>
                     </a:p>
                   </a:txBody>
@@ -23459,7 +23509,7 @@
                         <a:effectLst/>
                         <a:latin typeface="Calibri" panose="020F0502020204030204" pitchFamily="34" charset="0"/>
                         <a:ea typeface="Calibri" panose="020F0502020204030204" pitchFamily="34" charset="0"/>
-                        <a:cs typeface="Times New Roman" panose="02020603050405020304" pitchFamily="18" charset="0"/>
+                        <a:cs typeface="Times New Roman" panose="02020503050405090304" pitchFamily="18" charset="0"/>
                       </a:endParaRPr>
                     </a:p>
                   </a:txBody>
@@ -23489,7 +23539,7 @@
                         <a:effectLst/>
                         <a:latin typeface="Calibri" panose="020F0502020204030204" pitchFamily="34" charset="0"/>
                         <a:ea typeface="Calibri" panose="020F0502020204030204" pitchFamily="34" charset="0"/>
-                        <a:cs typeface="Times New Roman" panose="02020603050405020304" pitchFamily="18" charset="0"/>
+                        <a:cs typeface="Times New Roman" panose="02020503050405090304" pitchFamily="18" charset="0"/>
                       </a:endParaRPr>
                     </a:p>
                   </a:txBody>
@@ -23519,7 +23569,7 @@
                         <a:effectLst/>
                         <a:latin typeface="Calibri" panose="020F0502020204030204" pitchFamily="34" charset="0"/>
                         <a:ea typeface="Calibri" panose="020F0502020204030204" pitchFamily="34" charset="0"/>
-                        <a:cs typeface="Times New Roman" panose="02020603050405020304" pitchFamily="18" charset="0"/>
+                        <a:cs typeface="Times New Roman" panose="02020503050405090304" pitchFamily="18" charset="0"/>
                       </a:endParaRPr>
                     </a:p>
                   </a:txBody>
@@ -23550,7 +23600,7 @@
                           <a:effectLst/>
                           <a:latin typeface="Calibri" panose="020F0502020204030204" pitchFamily="34" charset="0"/>
                           <a:ea typeface="Calibri" panose="020F0502020204030204" pitchFamily="34" charset="0"/>
-                          <a:cs typeface="Times New Roman" panose="02020603050405020304" pitchFamily="18" charset="0"/>
+                          <a:cs typeface="Times New Roman" panose="02020503050405090304" pitchFamily="18" charset="0"/>
                         </a:rPr>
                         <a:t>x%</a:t>
                       </a:r>
@@ -23558,7 +23608,7 @@
                         <a:effectLst/>
                         <a:latin typeface="Calibri" panose="020F0502020204030204" pitchFamily="34" charset="0"/>
                         <a:ea typeface="Calibri" panose="020F0502020204030204" pitchFamily="34" charset="0"/>
-                        <a:cs typeface="Times New Roman" panose="02020603050405020304" pitchFamily="18" charset="0"/>
+                        <a:cs typeface="Times New Roman" panose="02020503050405090304" pitchFamily="18" charset="0"/>
                       </a:endParaRPr>
                     </a:p>
                   </a:txBody>
@@ -23603,7 +23653,7 @@
                   <a:srgbClr val="000000"/>
                 </a:solidFill>
                 <a:ea typeface="Calibri"/>
-                <a:cs typeface="Times New Roman" panose="02020603050405020304"/>
+                <a:cs typeface="Times New Roman" panose="02020503050405090304"/>
               </a:rPr>
               <a:t>Reported fusions:</a:t>
             </a:r>
@@ -23848,7 +23898,7 @@
                 <a:solidFill>
                   <a:schemeClr val="bg1"/>
                 </a:solidFill>
-                <a:latin typeface="Arial" panose="020B0604020202020204"/>
+                <a:latin typeface="Arial" panose="020B0604020202090204"/>
               </a:endParaRPr>
             </a:p>
           </p:txBody>
@@ -23942,7 +23992,7 @@
             </a:p>
             <a:p>
               <a:endParaRPr lang="en-US" sz="800" spc="-1" dirty="0">
-                <a:latin typeface="Arial" panose="020B0604020202020204"/>
+                <a:latin typeface="Arial" panose="020B0604020202090204"/>
               </a:endParaRPr>
             </a:p>
             <a:p>
@@ -23952,7 +24002,7 @@
                 </a:lnSpc>
               </a:pPr>
               <a:endParaRPr lang="en-US" sz="1000" b="0" strike="noStrike" spc="-1" dirty="0">
-                <a:latin typeface="Arial" panose="020B0604020202020204"/>
+                <a:latin typeface="Arial" panose="020B0604020202090204"/>
               </a:endParaRPr>
             </a:p>
           </p:txBody>
@@ -24078,7 +24128,7 @@
                   <a:effectLst/>
                   <a:uLnTx/>
                   <a:uFillTx/>
-                  <a:latin typeface="Arial" panose="020B0604020202020204"/>
+                  <a:latin typeface="Arial" panose="020B0604020202090204"/>
                   <a:ea typeface="+mn-ea"/>
                   <a:cs typeface="+mn-cs"/>
                 </a:rPr>
@@ -24095,7 +24145,7 @@
                   <a:effectLst/>
                   <a:uLnTx/>
                   <a:uFillTx/>
-                  <a:latin typeface="Arial" panose="020B0604020202020204"/>
+                  <a:latin typeface="Arial" panose="020B0604020202090204"/>
                   <a:ea typeface="+mn-ea"/>
                   <a:cs typeface="+mn-cs"/>
                 </a:rPr>
@@ -24111,7 +24161,7 @@
                 <a:effectLst/>
                 <a:uLnTx/>
                 <a:uFillTx/>
-                <a:latin typeface="Arial" panose="020B0604020202020204"/>
+                <a:latin typeface="Arial" panose="020B0604020202090204"/>
                 <a:ea typeface="+mn-ea"/>
                 <a:cs typeface="+mn-cs"/>
               </a:endParaRPr>
@@ -24219,7 +24269,7 @@
                 <a:effectLst/>
                 <a:uLnTx/>
                 <a:uFillTx/>
-                <a:latin typeface="Arial" panose="020B0604020202020204"/>
+                <a:latin typeface="Arial" panose="020B0604020202090204"/>
                 <a:ea typeface="+mn-ea"/>
                 <a:cs typeface="+mn-cs"/>
               </a:endParaRPr>
@@ -24251,7 +24301,7 @@
                 <a:effectLst/>
                 <a:uLnTx/>
                 <a:uFillTx/>
-                <a:latin typeface="Arial" panose="020B0604020202020204"/>
+                <a:latin typeface="Arial" panose="020B0604020202090204"/>
                 <a:ea typeface="+mn-ea"/>
                 <a:cs typeface="+mn-cs"/>
               </a:endParaRPr>
@@ -24379,7 +24429,7 @@
                   <a:effectLst/>
                   <a:uLnTx/>
                   <a:uFillTx/>
-                  <a:latin typeface="Arial" panose="020B0604020202020204"/>
+                  <a:latin typeface="Arial" panose="020B0604020202090204"/>
                   <a:ea typeface="+mn-ea"/>
                   <a:cs typeface="+mn-cs"/>
                 </a:rPr>
@@ -24396,7 +24446,7 @@
                   <a:effectLst/>
                   <a:uLnTx/>
                   <a:uFillTx/>
-                  <a:latin typeface="Arial" panose="020B0604020202020204"/>
+                  <a:latin typeface="Arial" panose="020B0604020202090204"/>
                   <a:ea typeface="+mn-ea"/>
                   <a:cs typeface="+mn-cs"/>
                 </a:rPr>
@@ -24412,7 +24462,7 @@
                 <a:effectLst/>
                 <a:uLnTx/>
                 <a:uFillTx/>
-                <a:latin typeface="Arial" panose="020B0604020202020204"/>
+                <a:latin typeface="Arial" panose="020B0604020202090204"/>
                 <a:ea typeface="+mn-ea"/>
                 <a:cs typeface="+mn-cs"/>
               </a:endParaRPr>
@@ -24692,7 +24742,7 @@
                 <a:effectLst/>
                 <a:uLnTx/>
                 <a:uFillTx/>
-                <a:latin typeface="Arial" panose="020B0604020202020204"/>
+                <a:latin typeface="Arial" panose="020B0604020202090204"/>
                 <a:ea typeface="+mn-ea"/>
                 <a:cs typeface="+mn-cs"/>
               </a:endParaRPr>
@@ -24724,7 +24774,7 @@
                 <a:effectLst/>
                 <a:uLnTx/>
                 <a:uFillTx/>
-                <a:latin typeface="Arial" panose="020B0604020202020204"/>
+                <a:latin typeface="Arial" panose="020B0604020202090204"/>
                 <a:ea typeface="+mn-ea"/>
                 <a:cs typeface="+mn-cs"/>
               </a:endParaRPr>
@@ -24852,7 +24902,7 @@
                   <a:effectLst/>
                   <a:uLnTx/>
                   <a:uFillTx/>
-                  <a:latin typeface="Arial" panose="020B0604020202020204"/>
+                  <a:latin typeface="Arial" panose="020B0604020202090204"/>
                   <a:ea typeface="+mn-ea"/>
                   <a:cs typeface="+mn-cs"/>
                 </a:rPr>
@@ -24869,7 +24919,7 @@
                   <a:effectLst/>
                   <a:uLnTx/>
                   <a:uFillTx/>
-                  <a:latin typeface="Arial" panose="020B0604020202020204"/>
+                  <a:latin typeface="Arial" panose="020B0604020202090204"/>
                   <a:ea typeface="+mn-ea"/>
                   <a:cs typeface="+mn-cs"/>
                 </a:rPr>
@@ -24885,7 +24935,7 @@
                 <a:effectLst/>
                 <a:uLnTx/>
                 <a:uFillTx/>
-                <a:latin typeface="Arial" panose="020B0604020202020204"/>
+                <a:latin typeface="Arial" panose="020B0604020202090204"/>
                 <a:ea typeface="+mn-ea"/>
                 <a:cs typeface="+mn-cs"/>
               </a:endParaRPr>
@@ -25207,7 +25257,7 @@
                 <a:effectLst/>
                 <a:uLnTx/>
                 <a:uFillTx/>
-                <a:latin typeface="Arial" panose="020B0604020202020204"/>
+                <a:latin typeface="Arial" panose="020B0604020202090204"/>
                 <a:ea typeface="+mn-ea"/>
                 <a:cs typeface="+mn-cs"/>
               </a:endParaRPr>
@@ -25239,7 +25289,7 @@
                 <a:effectLst/>
                 <a:uLnTx/>
                 <a:uFillTx/>
-                <a:latin typeface="Arial" panose="020B0604020202020204"/>
+                <a:latin typeface="Arial" panose="020B0604020202090204"/>
                 <a:ea typeface="+mn-ea"/>
                 <a:cs typeface="+mn-cs"/>
               </a:endParaRPr>
@@ -25340,7 +25390,7 @@
                           </a:solidFill>
                           <a:latin typeface="Calibri"/>
                           <a:ea typeface="Calibri"/>
-                          <a:cs typeface="Times New Roman" panose="02020603050405020304"/>
+                          <a:cs typeface="Times New Roman" panose="02020503050405090304"/>
                         </a:rPr>
                         <a:t>Gene</a:t>
                       </a:r>
@@ -25350,7 +25400,7 @@
                         </a:solidFill>
                         <a:latin typeface="Calibri"/>
                         <a:ea typeface="Calibri"/>
-                        <a:cs typeface="Times New Roman" panose="02020603050405020304"/>
+                        <a:cs typeface="Times New Roman" panose="02020503050405090304"/>
                       </a:endParaRPr>
                     </a:p>
                   </a:txBody>
@@ -25407,7 +25457,7 @@
                           </a:solidFill>
                           <a:latin typeface="Calibri"/>
                           <a:ea typeface="Calibri"/>
-                          <a:cs typeface="Times New Roman" panose="02020603050405020304"/>
+                          <a:cs typeface="Times New Roman" panose="02020503050405090304"/>
                         </a:rPr>
                         <a:t>Variant</a:t>
                       </a:r>
@@ -25417,7 +25467,7 @@
                         </a:solidFill>
                         <a:latin typeface="Calibri"/>
                         <a:ea typeface="Calibri"/>
-                        <a:cs typeface="Times New Roman" panose="02020603050405020304"/>
+                        <a:cs typeface="Times New Roman" panose="02020503050405090304"/>
                       </a:endParaRPr>
                     </a:p>
                   </a:txBody>
@@ -25480,7 +25530,7 @@
                           </a:solidFill>
                           <a:latin typeface="Calibri"/>
                           <a:ea typeface="Calibri"/>
-                          <a:cs typeface="Times New Roman" panose="02020603050405020304"/>
+                          <a:cs typeface="Times New Roman" panose="02020503050405090304"/>
                         </a:rPr>
                         <a:t>VAF</a:t>
                       </a:r>
@@ -25491,7 +25541,7 @@
                           </a:solidFill>
                           <a:latin typeface="Calibri"/>
                           <a:ea typeface="Calibri"/>
-                          <a:cs typeface="Times New Roman" panose="02020603050405020304"/>
+                          <a:cs typeface="Times New Roman" panose="02020503050405090304"/>
                         </a:rPr>
                         <a:t>/</a:t>
                       </a:r>
@@ -25501,7 +25551,7 @@
                         </a:solidFill>
                         <a:latin typeface="Calibri"/>
                         <a:ea typeface="Calibri"/>
-                        <a:cs typeface="Times New Roman" panose="02020603050405020304"/>
+                        <a:cs typeface="Times New Roman" panose="02020503050405090304"/>
                       </a:endParaRPr>
                     </a:p>
                     <a:p>
@@ -25523,7 +25573,7 @@
                           </a:solidFill>
                           <a:latin typeface="Calibri"/>
                           <a:ea typeface="Calibri"/>
-                          <a:cs typeface="Times New Roman" panose="02020603050405020304"/>
+                          <a:cs typeface="Times New Roman" panose="02020503050405090304"/>
                         </a:rPr>
                         <a:t>CN </a:t>
                       </a:r>
@@ -25533,7 +25583,7 @@
                         </a:solidFill>
                         <a:latin typeface="Calibri"/>
                         <a:ea typeface="Calibri"/>
-                        <a:cs typeface="Times New Roman" panose="02020603050405020304"/>
+                        <a:cs typeface="Times New Roman" panose="02020503050405090304"/>
                       </a:endParaRPr>
                     </a:p>
                   </a:txBody>
@@ -25596,7 +25646,7 @@
                           </a:solidFill>
                           <a:latin typeface="Calibri"/>
                           <a:ea typeface="Calibri"/>
-                          <a:cs typeface="Times New Roman" panose="02020603050405020304"/>
+                          <a:cs typeface="Times New Roman" panose="02020503050405090304"/>
                         </a:rPr>
                         <a:t>GoF</a:t>
                       </a:r>
@@ -25607,7 +25657,7 @@
                           </a:solidFill>
                           <a:latin typeface="Calibri"/>
                           <a:ea typeface="Calibri"/>
-                          <a:cs typeface="Times New Roman" panose="02020603050405020304"/>
+                          <a:cs typeface="Times New Roman" panose="02020503050405090304"/>
                         </a:rPr>
                         <a:t>/</a:t>
                       </a:r>
@@ -25617,7 +25667,7 @@
                         </a:solidFill>
                         <a:latin typeface="Calibri"/>
                         <a:ea typeface="Calibri"/>
-                        <a:cs typeface="Times New Roman" panose="02020603050405020304"/>
+                        <a:cs typeface="Times New Roman" panose="02020503050405090304"/>
                       </a:endParaRPr>
                     </a:p>
                     <a:p>
@@ -25639,7 +25689,7 @@
                           </a:solidFill>
                           <a:latin typeface="Calibri"/>
                           <a:ea typeface="Calibri"/>
-                          <a:cs typeface="Times New Roman" panose="02020603050405020304"/>
+                          <a:cs typeface="Times New Roman" panose="02020503050405090304"/>
                         </a:rPr>
                         <a:t>LoF</a:t>
                       </a:r>
@@ -25649,7 +25699,7 @@
                         </a:solidFill>
                         <a:latin typeface="Calibri"/>
                         <a:ea typeface="Calibri"/>
-                        <a:cs typeface="Times New Roman" panose="02020603050405020304"/>
+                        <a:cs typeface="Times New Roman" panose="02020503050405090304"/>
                       </a:endParaRPr>
                     </a:p>
                   </a:txBody>
@@ -25712,7 +25762,7 @@
                           </a:solidFill>
                           <a:latin typeface="Calibri"/>
                           <a:ea typeface="Calibri"/>
-                          <a:cs typeface="Times New Roman" panose="02020603050405020304"/>
+                          <a:cs typeface="Times New Roman" panose="02020503050405090304"/>
                         </a:rPr>
                         <a:t>Pathway</a:t>
                       </a:r>
@@ -25723,7 +25773,7 @@
                           </a:solidFill>
                           <a:latin typeface="Calibri"/>
                           <a:ea typeface="Calibri"/>
-                          <a:cs typeface="Times New Roman" panose="02020603050405020304"/>
+                          <a:cs typeface="Times New Roman" panose="02020503050405090304"/>
                         </a:rPr>
                         <a:t>/</a:t>
                       </a:r>
@@ -25733,7 +25783,7 @@
                         </a:solidFill>
                         <a:latin typeface="Calibri"/>
                         <a:ea typeface="Calibri"/>
-                        <a:cs typeface="Times New Roman" panose="02020603050405020304"/>
+                        <a:cs typeface="Times New Roman" panose="02020503050405090304"/>
                       </a:endParaRPr>
                     </a:p>
                     <a:p>
@@ -25755,7 +25805,7 @@
                           </a:solidFill>
                           <a:latin typeface="Calibri"/>
                           <a:ea typeface="Calibri"/>
-                          <a:cs typeface="Times New Roman" panose="02020603050405020304"/>
+                          <a:cs typeface="Times New Roman" panose="02020503050405090304"/>
                         </a:rPr>
                         <a:t>function</a:t>
                       </a:r>
@@ -25765,7 +25815,7 @@
                         </a:solidFill>
                         <a:latin typeface="Calibri"/>
                         <a:ea typeface="Calibri"/>
-                        <a:cs typeface="Times New Roman" panose="02020603050405020304"/>
+                        <a:cs typeface="Times New Roman" panose="02020503050405090304"/>
                       </a:endParaRPr>
                     </a:p>
                   </a:txBody>
@@ -25828,7 +25878,7 @@
                           </a:solidFill>
                           <a:latin typeface="Calibri"/>
                           <a:ea typeface="Calibri"/>
-                          <a:cs typeface="Times New Roman" panose="02020603050405020304"/>
+                          <a:cs typeface="Times New Roman" panose="02020503050405090304"/>
                         </a:rPr>
                         <a:t>Comments</a:t>
                       </a:r>
@@ -25838,7 +25888,7 @@
                         </a:solidFill>
                         <a:latin typeface="Calibri"/>
                         <a:ea typeface="Calibri"/>
-                        <a:cs typeface="Times New Roman" panose="02020603050405020304"/>
+                        <a:cs typeface="Times New Roman" panose="02020503050405090304"/>
                       </a:endParaRPr>
                     </a:p>
                   </a:txBody>
@@ -25909,7 +25959,7 @@
                         </a:solidFill>
                         <a:latin typeface="+mn-lt"/>
                         <a:ea typeface="Calibri"/>
-                        <a:cs typeface="Times New Roman" panose="02020603050405020304"/>
+                        <a:cs typeface="Times New Roman" panose="02020503050405090304"/>
                       </a:endParaRPr>
                     </a:p>
                   </a:txBody>
@@ -25965,7 +26015,7 @@
                         </a:solidFill>
                         <a:latin typeface="+mn-lt"/>
                         <a:ea typeface="Calibri"/>
-                        <a:cs typeface="Times New Roman" panose="02020603050405020304"/>
+                        <a:cs typeface="Times New Roman" panose="02020503050405090304"/>
                       </a:endParaRPr>
                     </a:p>
                   </a:txBody>
@@ -26016,7 +26066,7 @@
                         </a:solidFill>
                         <a:latin typeface="Calibri"/>
                         <a:ea typeface="Calibri"/>
-                        <a:cs typeface="Times New Roman" panose="02020603050405020304"/>
+                        <a:cs typeface="Times New Roman" panose="02020503050405090304"/>
                       </a:endParaRPr>
                     </a:p>
                   </a:txBody>
@@ -26072,7 +26122,7 @@
                         </a:solidFill>
                         <a:latin typeface="+mn-lt"/>
                         <a:ea typeface="Calibri"/>
-                        <a:cs typeface="Times New Roman" panose="02020603050405020304"/>
+                        <a:cs typeface="Times New Roman" panose="02020503050405090304"/>
                       </a:endParaRPr>
                     </a:p>
                   </a:txBody>
@@ -26123,7 +26173,7 @@
                         </a:solidFill>
                         <a:latin typeface="Calibri"/>
                         <a:ea typeface="Calibri"/>
-                        <a:cs typeface="Times New Roman" panose="02020603050405020304"/>
+                        <a:cs typeface="Times New Roman" panose="02020503050405090304"/>
                       </a:endParaRPr>
                     </a:p>
                   </a:txBody>
@@ -26238,7 +26288,7 @@
                         </a:solidFill>
                         <a:latin typeface="+mn-lt"/>
                         <a:ea typeface="Calibri"/>
-                        <a:cs typeface="Times New Roman" panose="02020603050405020304"/>
+                        <a:cs typeface="Times New Roman" panose="02020503050405090304"/>
                       </a:endParaRPr>
                     </a:p>
                   </a:txBody>
@@ -26303,7 +26353,7 @@
                         </a:solidFill>
                         <a:latin typeface="+mn-lt"/>
                         <a:ea typeface="Calibri"/>
-                        <a:cs typeface="Times New Roman" panose="02020603050405020304"/>
+                        <a:cs typeface="Times New Roman" panose="02020503050405090304"/>
                       </a:endParaRPr>
                     </a:p>
                   </a:txBody>
@@ -26363,7 +26413,7 @@
                         </a:solidFill>
                         <a:latin typeface="Calibri"/>
                         <a:ea typeface="Calibri"/>
-                        <a:cs typeface="Times New Roman" panose="02020603050405020304"/>
+                        <a:cs typeface="Times New Roman" panose="02020503050405090304"/>
                       </a:endParaRPr>
                     </a:p>
                   </a:txBody>
@@ -26423,7 +26473,7 @@
                         </a:solidFill>
                         <a:latin typeface="Calibri"/>
                         <a:ea typeface="Calibri"/>
-                        <a:cs typeface="Times New Roman" panose="02020603050405020304"/>
+                        <a:cs typeface="Times New Roman" panose="02020503050405090304"/>
                       </a:endParaRPr>
                     </a:p>
                   </a:txBody>
@@ -26483,7 +26533,7 @@
                         </a:solidFill>
                         <a:latin typeface="Calibri"/>
                         <a:ea typeface="Calibri"/>
-                        <a:cs typeface="Times New Roman" panose="02020603050405020304"/>
+                        <a:cs typeface="Times New Roman" panose="02020503050405090304"/>
                       </a:endParaRPr>
                     </a:p>
                   </a:txBody>
@@ -26616,7 +26666,7 @@
                         </a:solidFill>
                         <a:latin typeface="+mn-lt"/>
                         <a:ea typeface="Calibri"/>
-                        <a:cs typeface="Times New Roman" panose="02020603050405020304"/>
+                        <a:cs typeface="Times New Roman" panose="02020503050405090304"/>
                       </a:endParaRPr>
                     </a:p>
                   </a:txBody>
@@ -26681,7 +26731,7 @@
                         </a:solidFill>
                         <a:latin typeface="+mn-lt"/>
                         <a:ea typeface="Calibri"/>
-                        <a:cs typeface="Times New Roman" panose="02020603050405020304"/>
+                        <a:cs typeface="Times New Roman" panose="02020503050405090304"/>
                       </a:endParaRPr>
                     </a:p>
                   </a:txBody>
@@ -26741,7 +26791,7 @@
                         </a:solidFill>
                         <a:latin typeface="Calibri"/>
                         <a:ea typeface="Calibri"/>
-                        <a:cs typeface="Times New Roman" panose="02020603050405020304"/>
+                        <a:cs typeface="Times New Roman" panose="02020503050405090304"/>
                       </a:endParaRPr>
                     </a:p>
                   </a:txBody>
@@ -26801,7 +26851,7 @@
                         </a:solidFill>
                         <a:latin typeface="Calibri"/>
                         <a:ea typeface="Calibri"/>
-                        <a:cs typeface="Times New Roman" panose="02020603050405020304"/>
+                        <a:cs typeface="Times New Roman" panose="02020503050405090304"/>
                       </a:endParaRPr>
                     </a:p>
                   </a:txBody>
@@ -26861,7 +26911,7 @@
                         </a:solidFill>
                         <a:latin typeface="Calibri"/>
                         <a:ea typeface="Calibri"/>
-                        <a:cs typeface="Times New Roman" panose="02020603050405020304"/>
+                        <a:cs typeface="Times New Roman" panose="02020503050405090304"/>
                       </a:endParaRPr>
                     </a:p>
                   </a:txBody>
@@ -26994,7 +27044,7 @@
                         </a:solidFill>
                         <a:latin typeface="+mn-lt"/>
                         <a:ea typeface="Calibri"/>
-                        <a:cs typeface="Times New Roman" panose="02020603050405020304"/>
+                        <a:cs typeface="Times New Roman" panose="02020503050405090304"/>
                       </a:endParaRPr>
                     </a:p>
                   </a:txBody>
@@ -27059,7 +27109,7 @@
                         </a:solidFill>
                         <a:latin typeface="+mn-lt"/>
                         <a:ea typeface="Calibri"/>
-                        <a:cs typeface="Times New Roman" panose="02020603050405020304"/>
+                        <a:cs typeface="Times New Roman" panose="02020503050405090304"/>
                       </a:endParaRPr>
                     </a:p>
                   </a:txBody>
@@ -27119,7 +27169,7 @@
                         </a:solidFill>
                         <a:latin typeface="Calibri"/>
                         <a:ea typeface="Calibri"/>
-                        <a:cs typeface="Times New Roman" panose="02020603050405020304"/>
+                        <a:cs typeface="Times New Roman" panose="02020503050405090304"/>
                       </a:endParaRPr>
                     </a:p>
                   </a:txBody>
@@ -27179,7 +27229,7 @@
                         </a:solidFill>
                         <a:latin typeface="Calibri"/>
                         <a:ea typeface="Calibri"/>
-                        <a:cs typeface="Times New Roman" panose="02020603050405020304"/>
+                        <a:cs typeface="Times New Roman" panose="02020503050405090304"/>
                       </a:endParaRPr>
                     </a:p>
                   </a:txBody>
@@ -27239,7 +27289,7 @@
                         </a:solidFill>
                         <a:latin typeface="Calibri"/>
                         <a:ea typeface="Calibri"/>
-                        <a:cs typeface="Times New Roman" panose="02020603050405020304"/>
+                        <a:cs typeface="Times New Roman" panose="02020503050405090304"/>
                       </a:endParaRPr>
                     </a:p>
                   </a:txBody>

</xml_diff>

<commit_message>
New template file with year "2026".
</commit_message>
<xml_diff>
--- a/In/Template/InPreD_MTB_template.pptx
+++ b/In/Template/InPreD_MTB_template.pptx
@@ -6175,7 +6175,7 @@
                 </a:solidFill>
                 <a:latin typeface="Calibri"/>
               </a:rPr>
-              <a:t>5</a:t>
+              <a:t>6</a:t>
             </a:r>
             <a:endParaRPr lang="nb-NO" altLang="en-US" sz="800" b="0" strike="noStrike" spc="-1" dirty="0" smtClean="0">
               <a:solidFill>
@@ -8181,7 +8181,7 @@
                 </a:solidFill>
                 <a:latin typeface="Calibri"/>
               </a:rPr>
-              <a:t>5</a:t>
+              <a:t>6</a:t>
             </a:r>
             <a:endParaRPr lang="nb-NO" altLang="en-US" sz="800" b="0" strike="noStrike" spc="-1" dirty="0" smtClean="0">
               <a:solidFill>
@@ -10454,7 +10454,7 @@
                 </a:solidFill>
                 <a:latin typeface="Calibri"/>
               </a:rPr>
-              <a:t>5</a:t>
+              <a:t>6</a:t>
             </a:r>
             <a:endParaRPr lang="nb-NO" altLang="en-US" sz="800" b="0" strike="noStrike" spc="-1" dirty="0" smtClean="0">
               <a:solidFill>
@@ -13624,7 +13624,7 @@
                 </a:solidFill>
                 <a:latin typeface="Calibri"/>
               </a:rPr>
-              <a:t>5</a:t>
+              <a:t>6</a:t>
             </a:r>
             <a:endParaRPr lang="nb-NO" altLang="en-US" sz="800" b="0" strike="noStrike" spc="-1" dirty="0" smtClean="0">
               <a:solidFill>
@@ -18929,7 +18929,7 @@
                 </a:solidFill>
                 <a:latin typeface="Calibri"/>
               </a:rPr>
-              <a:t>5</a:t>
+              <a:t>6</a:t>
             </a:r>
             <a:endParaRPr lang="nb-NO" altLang="en-US" sz="800" b="0" strike="noStrike" spc="-1" dirty="0" smtClean="0">
               <a:solidFill>

</xml_diff>

<commit_message>
Update the "year" in the top left of report automatically.
</commit_message>
<xml_diff>
--- a/In/Template/InPreD_MTB_template.pptx
+++ b/In/Template/InPreD_MTB_template.pptx
@@ -6081,113 +6081,6 @@
       </p:sp>
       <p:sp>
         <p:nvSpPr>
-          <p:cNvPr id="119" name="Rectangle 73"/>
-          <p:cNvSpPr/>
-          <p:nvPr/>
-        </p:nvSpPr>
-        <p:spPr>
-          <a:xfrm>
-            <a:off x="1218" y="-5264"/>
-            <a:ext cx="503640" cy="673100"/>
-          </a:xfrm>
-          <a:prstGeom prst="rect">
-            <a:avLst/>
-          </a:prstGeom>
-          <a:noFill/>
-          <a:ln w="0">
-            <a:noFill/>
-          </a:ln>
-        </p:spPr>
-        <p:style>
-          <a:lnRef idx="0">
-            <a:srgbClr val="FFFFFF"/>
-          </a:lnRef>
-          <a:fillRef idx="0">
-            <a:srgbClr val="FFFFFF"/>
-          </a:fillRef>
-          <a:effectRef idx="0">
-            <a:srgbClr val="FFFFFF"/>
-          </a:effectRef>
-          <a:fontRef idx="minor"/>
-        </p:style>
-        <p:txBody>
-          <a:bodyPr lIns="90000" tIns="45000" rIns="90000" bIns="45000">
-            <a:spAutoFit/>
-          </a:bodyPr>
-          <a:lstStyle/>
-          <a:p>
-            <a:pPr algn="ctr">
-              <a:lnSpc>
-                <a:spcPct val="100000"/>
-              </a:lnSpc>
-            </a:pPr>
-            <a:r>
-              <a:rPr lang="en-US" sz="1800" b="0" strike="noStrike" spc="-1" dirty="0" smtClean="0">
-                <a:solidFill>
-                  <a:srgbClr val="FFFFFF"/>
-                </a:solidFill>
-                <a:latin typeface="Calibri"/>
-              </a:rPr>
-              <a:t>xx</a:t>
-            </a:r>
-            <a:endParaRPr lang="en-US" sz="1800" b="0" strike="noStrike" spc="-1" dirty="0">
-              <a:latin typeface="Arial" panose="020B0604020202090204"/>
-            </a:endParaRPr>
-          </a:p>
-          <a:p>
-            <a:pPr algn="ctr">
-              <a:lnSpc>
-                <a:spcPct val="100000"/>
-              </a:lnSpc>
-            </a:pPr>
-            <a:r>
-              <a:rPr lang="en-US" sz="1200" b="0" strike="noStrike" spc="-1" dirty="0">
-                <a:solidFill>
-                  <a:srgbClr val="FFFFFF"/>
-                </a:solidFill>
-                <a:latin typeface="Calibri"/>
-              </a:rPr>
-              <a:t>XXX</a:t>
-            </a:r>
-            <a:endParaRPr lang="en-US" sz="1200" b="0" strike="noStrike" spc="-1" dirty="0">
-              <a:latin typeface="Arial" panose="020B0604020202090204"/>
-            </a:endParaRPr>
-          </a:p>
-          <a:p>
-            <a:pPr algn="ctr">
-              <a:lnSpc>
-                <a:spcPct val="100000"/>
-              </a:lnSpc>
-            </a:pPr>
-            <a:r>
-              <a:rPr lang="en-US" sz="800" b="0" strike="noStrike" spc="-1" dirty="0" smtClean="0">
-                <a:solidFill>
-                  <a:srgbClr val="FFFFFF"/>
-                </a:solidFill>
-                <a:latin typeface="Calibri"/>
-              </a:rPr>
-              <a:t>202</a:t>
-            </a:r>
-            <a:r>
-              <a:rPr lang="nb-NO" altLang="en-US" sz="800" b="0" strike="noStrike" spc="-1" dirty="0" smtClean="0">
-                <a:solidFill>
-                  <a:srgbClr val="FFFFFF"/>
-                </a:solidFill>
-                <a:latin typeface="Calibri"/>
-              </a:rPr>
-              <a:t>6</a:t>
-            </a:r>
-            <a:endParaRPr lang="nb-NO" altLang="en-US" sz="800" b="0" strike="noStrike" spc="-1" dirty="0" smtClean="0">
-              <a:solidFill>
-                <a:srgbClr val="FFFFFF"/>
-              </a:solidFill>
-              <a:latin typeface="Calibri"/>
-            </a:endParaRPr>
-          </a:p>
-        </p:txBody>
-      </p:sp>
-      <p:sp>
-        <p:nvSpPr>
           <p:cNvPr id="120" name="Rectangle 74"/>
           <p:cNvSpPr/>
           <p:nvPr/>
@@ -8084,113 +7977,6 @@
           </a:effectRef>
           <a:fontRef idx="minor"/>
         </p:style>
-      </p:sp>
-      <p:sp>
-        <p:nvSpPr>
-          <p:cNvPr id="19" name="Rectangle 73"/>
-          <p:cNvSpPr/>
-          <p:nvPr/>
-        </p:nvSpPr>
-        <p:spPr>
-          <a:xfrm>
-            <a:off x="1218" y="-5264"/>
-            <a:ext cx="503640" cy="673100"/>
-          </a:xfrm>
-          <a:prstGeom prst="rect">
-            <a:avLst/>
-          </a:prstGeom>
-          <a:noFill/>
-          <a:ln w="0">
-            <a:noFill/>
-          </a:ln>
-        </p:spPr>
-        <p:style>
-          <a:lnRef idx="0">
-            <a:srgbClr val="FFFFFF"/>
-          </a:lnRef>
-          <a:fillRef idx="0">
-            <a:srgbClr val="FFFFFF"/>
-          </a:fillRef>
-          <a:effectRef idx="0">
-            <a:srgbClr val="FFFFFF"/>
-          </a:effectRef>
-          <a:fontRef idx="minor"/>
-        </p:style>
-        <p:txBody>
-          <a:bodyPr lIns="90000" tIns="45000" rIns="90000" bIns="45000">
-            <a:spAutoFit/>
-          </a:bodyPr>
-          <a:lstStyle/>
-          <a:p>
-            <a:pPr algn="ctr">
-              <a:lnSpc>
-                <a:spcPct val="100000"/>
-              </a:lnSpc>
-            </a:pPr>
-            <a:r>
-              <a:rPr lang="en-US" sz="1800" b="0" strike="noStrike" spc="-1" dirty="0" smtClean="0">
-                <a:solidFill>
-                  <a:srgbClr val="FFFFFF"/>
-                </a:solidFill>
-                <a:latin typeface="Calibri"/>
-              </a:rPr>
-              <a:t>xx</a:t>
-            </a:r>
-            <a:endParaRPr lang="en-US" sz="1800" b="0" strike="noStrike" spc="-1" dirty="0">
-              <a:latin typeface="Arial" panose="020B0604020202090204"/>
-            </a:endParaRPr>
-          </a:p>
-          <a:p>
-            <a:pPr algn="ctr">
-              <a:lnSpc>
-                <a:spcPct val="100000"/>
-              </a:lnSpc>
-            </a:pPr>
-            <a:r>
-              <a:rPr lang="en-US" sz="1200" b="0" strike="noStrike" spc="-1" dirty="0">
-                <a:solidFill>
-                  <a:srgbClr val="FFFFFF"/>
-                </a:solidFill>
-                <a:latin typeface="Calibri"/>
-              </a:rPr>
-              <a:t>XXX</a:t>
-            </a:r>
-            <a:endParaRPr lang="en-US" sz="1200" b="0" strike="noStrike" spc="-1" dirty="0">
-              <a:latin typeface="Arial" panose="020B0604020202090204"/>
-            </a:endParaRPr>
-          </a:p>
-          <a:p>
-            <a:pPr algn="ctr">
-              <a:lnSpc>
-                <a:spcPct val="100000"/>
-              </a:lnSpc>
-            </a:pPr>
-            <a:r>
-              <a:rPr lang="en-US" sz="800" b="0" strike="noStrike" spc="-1" dirty="0" smtClean="0">
-                <a:solidFill>
-                  <a:srgbClr val="FFFFFF"/>
-                </a:solidFill>
-                <a:latin typeface="Calibri"/>
-              </a:rPr>
-              <a:t>202</a:t>
-            </a:r>
-            <a:r>
-              <a:rPr lang="nb-NO" altLang="en-US" sz="800" b="0" strike="noStrike" spc="-1" dirty="0" smtClean="0">
-                <a:solidFill>
-                  <a:srgbClr val="FFFFFF"/>
-                </a:solidFill>
-                <a:latin typeface="Calibri"/>
-              </a:rPr>
-              <a:t>6</a:t>
-            </a:r>
-            <a:endParaRPr lang="nb-NO" altLang="en-US" sz="800" b="0" strike="noStrike" spc="-1" dirty="0" smtClean="0">
-              <a:solidFill>
-                <a:srgbClr val="FFFFFF"/>
-              </a:solidFill>
-              <a:latin typeface="Calibri"/>
-            </a:endParaRPr>
-          </a:p>
-        </p:txBody>
       </p:sp>
       <p:sp>
         <p:nvSpPr>
@@ -10360,113 +10146,6 @@
       </p:sp>
       <p:sp>
         <p:nvSpPr>
-          <p:cNvPr id="61" name="Rectangle 73"/>
-          <p:cNvSpPr/>
-          <p:nvPr/>
-        </p:nvSpPr>
-        <p:spPr>
-          <a:xfrm>
-            <a:off x="1218" y="-5264"/>
-            <a:ext cx="503640" cy="673100"/>
-          </a:xfrm>
-          <a:prstGeom prst="rect">
-            <a:avLst/>
-          </a:prstGeom>
-          <a:noFill/>
-          <a:ln w="0">
-            <a:noFill/>
-          </a:ln>
-        </p:spPr>
-        <p:style>
-          <a:lnRef idx="0">
-            <a:srgbClr val="FFFFFF"/>
-          </a:lnRef>
-          <a:fillRef idx="0">
-            <a:srgbClr val="FFFFFF"/>
-          </a:fillRef>
-          <a:effectRef idx="0">
-            <a:srgbClr val="FFFFFF"/>
-          </a:effectRef>
-          <a:fontRef idx="minor"/>
-        </p:style>
-        <p:txBody>
-          <a:bodyPr lIns="90000" tIns="45000" rIns="90000" bIns="45000">
-            <a:spAutoFit/>
-          </a:bodyPr>
-          <a:lstStyle/>
-          <a:p>
-            <a:pPr algn="ctr">
-              <a:lnSpc>
-                <a:spcPct val="100000"/>
-              </a:lnSpc>
-            </a:pPr>
-            <a:r>
-              <a:rPr lang="en-US" sz="1800" b="0" strike="noStrike" spc="-1" dirty="0" smtClean="0">
-                <a:solidFill>
-                  <a:srgbClr val="FFFFFF"/>
-                </a:solidFill>
-                <a:latin typeface="Calibri"/>
-              </a:rPr>
-              <a:t>xx</a:t>
-            </a:r>
-            <a:endParaRPr lang="en-US" sz="1800" b="0" strike="noStrike" spc="-1" dirty="0">
-              <a:latin typeface="Arial" panose="020B0604020202090204"/>
-            </a:endParaRPr>
-          </a:p>
-          <a:p>
-            <a:pPr algn="ctr">
-              <a:lnSpc>
-                <a:spcPct val="100000"/>
-              </a:lnSpc>
-            </a:pPr>
-            <a:r>
-              <a:rPr lang="en-US" sz="1200" b="0" strike="noStrike" spc="-1" dirty="0">
-                <a:solidFill>
-                  <a:srgbClr val="FFFFFF"/>
-                </a:solidFill>
-                <a:latin typeface="Calibri"/>
-              </a:rPr>
-              <a:t>XXX</a:t>
-            </a:r>
-            <a:endParaRPr lang="en-US" sz="1200" b="0" strike="noStrike" spc="-1" dirty="0">
-              <a:latin typeface="Arial" panose="020B0604020202090204"/>
-            </a:endParaRPr>
-          </a:p>
-          <a:p>
-            <a:pPr algn="ctr">
-              <a:lnSpc>
-                <a:spcPct val="100000"/>
-              </a:lnSpc>
-            </a:pPr>
-            <a:r>
-              <a:rPr lang="en-US" sz="800" b="0" strike="noStrike" spc="-1" dirty="0" smtClean="0">
-                <a:solidFill>
-                  <a:srgbClr val="FFFFFF"/>
-                </a:solidFill>
-                <a:latin typeface="Calibri"/>
-              </a:rPr>
-              <a:t>202</a:t>
-            </a:r>
-            <a:r>
-              <a:rPr lang="nb-NO" altLang="en-US" sz="800" b="0" strike="noStrike" spc="-1" dirty="0" smtClean="0">
-                <a:solidFill>
-                  <a:srgbClr val="FFFFFF"/>
-                </a:solidFill>
-                <a:latin typeface="Calibri"/>
-              </a:rPr>
-              <a:t>6</a:t>
-            </a:r>
-            <a:endParaRPr lang="nb-NO" altLang="en-US" sz="800" b="0" strike="noStrike" spc="-1" dirty="0" smtClean="0">
-              <a:solidFill>
-                <a:srgbClr val="FFFFFF"/>
-              </a:solidFill>
-              <a:latin typeface="Calibri"/>
-            </a:endParaRPr>
-          </a:p>
-        </p:txBody>
-      </p:sp>
-      <p:sp>
-        <p:nvSpPr>
           <p:cNvPr id="62" name="Rectangle 74"/>
           <p:cNvSpPr/>
           <p:nvPr/>
@@ -13527,113 +13206,6 @@
           </a:effectRef>
           <a:fontRef idx="minor"/>
         </p:style>
-      </p:sp>
-      <p:sp>
-        <p:nvSpPr>
-          <p:cNvPr id="107" name="Rectangle 73"/>
-          <p:cNvSpPr/>
-          <p:nvPr/>
-        </p:nvSpPr>
-        <p:spPr>
-          <a:xfrm>
-            <a:off x="1218" y="-5264"/>
-            <a:ext cx="503640" cy="673100"/>
-          </a:xfrm>
-          <a:prstGeom prst="rect">
-            <a:avLst/>
-          </a:prstGeom>
-          <a:noFill/>
-          <a:ln w="0">
-            <a:noFill/>
-          </a:ln>
-        </p:spPr>
-        <p:style>
-          <a:lnRef idx="0">
-            <a:srgbClr val="FFFFFF"/>
-          </a:lnRef>
-          <a:fillRef idx="0">
-            <a:srgbClr val="FFFFFF"/>
-          </a:fillRef>
-          <a:effectRef idx="0">
-            <a:srgbClr val="FFFFFF"/>
-          </a:effectRef>
-          <a:fontRef idx="minor"/>
-        </p:style>
-        <p:txBody>
-          <a:bodyPr lIns="90000" tIns="45000" rIns="90000" bIns="45000">
-            <a:spAutoFit/>
-          </a:bodyPr>
-          <a:lstStyle/>
-          <a:p>
-            <a:pPr algn="ctr">
-              <a:lnSpc>
-                <a:spcPct val="100000"/>
-              </a:lnSpc>
-            </a:pPr>
-            <a:r>
-              <a:rPr lang="en-US" sz="1800" b="0" strike="noStrike" spc="-1" dirty="0" smtClean="0">
-                <a:solidFill>
-                  <a:srgbClr val="FFFFFF"/>
-                </a:solidFill>
-                <a:latin typeface="Calibri"/>
-              </a:rPr>
-              <a:t>xx</a:t>
-            </a:r>
-            <a:endParaRPr lang="en-US" sz="1800" b="0" strike="noStrike" spc="-1" dirty="0">
-              <a:latin typeface="Arial" panose="020B0604020202090204"/>
-            </a:endParaRPr>
-          </a:p>
-          <a:p>
-            <a:pPr algn="ctr">
-              <a:lnSpc>
-                <a:spcPct val="100000"/>
-              </a:lnSpc>
-            </a:pPr>
-            <a:r>
-              <a:rPr lang="en-US" sz="1200" b="0" strike="noStrike" spc="-1" dirty="0">
-                <a:solidFill>
-                  <a:srgbClr val="FFFFFF"/>
-                </a:solidFill>
-                <a:latin typeface="Calibri"/>
-              </a:rPr>
-              <a:t>XXX</a:t>
-            </a:r>
-            <a:endParaRPr lang="en-US" sz="1200" b="0" strike="noStrike" spc="-1" dirty="0">
-              <a:latin typeface="Arial" panose="020B0604020202090204"/>
-            </a:endParaRPr>
-          </a:p>
-          <a:p>
-            <a:pPr algn="ctr">
-              <a:lnSpc>
-                <a:spcPct val="100000"/>
-              </a:lnSpc>
-            </a:pPr>
-            <a:r>
-              <a:rPr lang="en-US" sz="800" b="0" strike="noStrike" spc="-1" dirty="0" smtClean="0">
-                <a:solidFill>
-                  <a:srgbClr val="FFFFFF"/>
-                </a:solidFill>
-                <a:latin typeface="Calibri"/>
-              </a:rPr>
-              <a:t>202</a:t>
-            </a:r>
-            <a:r>
-              <a:rPr lang="nb-NO" altLang="en-US" sz="800" b="0" strike="noStrike" spc="-1" dirty="0" smtClean="0">
-                <a:solidFill>
-                  <a:srgbClr val="FFFFFF"/>
-                </a:solidFill>
-                <a:latin typeface="Calibri"/>
-              </a:rPr>
-              <a:t>6</a:t>
-            </a:r>
-            <a:endParaRPr lang="nb-NO" altLang="en-US" sz="800" b="0" strike="noStrike" spc="-1" dirty="0" smtClean="0">
-              <a:solidFill>
-                <a:srgbClr val="FFFFFF"/>
-              </a:solidFill>
-              <a:latin typeface="Calibri"/>
-            </a:endParaRPr>
-          </a:p>
-        </p:txBody>
       </p:sp>
       <p:sp>
         <p:nvSpPr>
@@ -18832,113 +18404,6 @@
           </a:effectRef>
           <a:fontRef idx="minor"/>
         </p:style>
-      </p:sp>
-      <p:sp>
-        <p:nvSpPr>
-          <p:cNvPr id="110" name="Rectangle 73"/>
-          <p:cNvSpPr/>
-          <p:nvPr/>
-        </p:nvSpPr>
-        <p:spPr>
-          <a:xfrm>
-            <a:off x="1218" y="-5264"/>
-            <a:ext cx="503640" cy="673100"/>
-          </a:xfrm>
-          <a:prstGeom prst="rect">
-            <a:avLst/>
-          </a:prstGeom>
-          <a:noFill/>
-          <a:ln w="0">
-            <a:noFill/>
-          </a:ln>
-        </p:spPr>
-        <p:style>
-          <a:lnRef idx="0">
-            <a:srgbClr val="FFFFFF"/>
-          </a:lnRef>
-          <a:fillRef idx="0">
-            <a:srgbClr val="FFFFFF"/>
-          </a:fillRef>
-          <a:effectRef idx="0">
-            <a:srgbClr val="FFFFFF"/>
-          </a:effectRef>
-          <a:fontRef idx="minor"/>
-        </p:style>
-        <p:txBody>
-          <a:bodyPr lIns="90000" tIns="45000" rIns="90000" bIns="45000">
-            <a:spAutoFit/>
-          </a:bodyPr>
-          <a:lstStyle/>
-          <a:p>
-            <a:pPr algn="ctr">
-              <a:lnSpc>
-                <a:spcPct val="100000"/>
-              </a:lnSpc>
-            </a:pPr>
-            <a:r>
-              <a:rPr lang="en-US" sz="1800" b="0" strike="noStrike" spc="-1" dirty="0" smtClean="0">
-                <a:solidFill>
-                  <a:srgbClr val="FFFFFF"/>
-                </a:solidFill>
-                <a:latin typeface="Calibri"/>
-              </a:rPr>
-              <a:t>xx</a:t>
-            </a:r>
-            <a:endParaRPr lang="en-US" sz="1800" b="0" strike="noStrike" spc="-1" dirty="0">
-              <a:latin typeface="Arial" panose="020B0604020202090204"/>
-            </a:endParaRPr>
-          </a:p>
-          <a:p>
-            <a:pPr algn="ctr">
-              <a:lnSpc>
-                <a:spcPct val="100000"/>
-              </a:lnSpc>
-            </a:pPr>
-            <a:r>
-              <a:rPr lang="en-US" sz="1200" b="0" strike="noStrike" spc="-1" dirty="0">
-                <a:solidFill>
-                  <a:srgbClr val="FFFFFF"/>
-                </a:solidFill>
-                <a:latin typeface="Calibri"/>
-              </a:rPr>
-              <a:t>XXX</a:t>
-            </a:r>
-            <a:endParaRPr lang="en-US" sz="1200" b="0" strike="noStrike" spc="-1" dirty="0">
-              <a:latin typeface="Arial" panose="020B0604020202090204"/>
-            </a:endParaRPr>
-          </a:p>
-          <a:p>
-            <a:pPr algn="ctr">
-              <a:lnSpc>
-                <a:spcPct val="100000"/>
-              </a:lnSpc>
-            </a:pPr>
-            <a:r>
-              <a:rPr lang="en-US" sz="800" b="0" strike="noStrike" spc="-1" dirty="0" smtClean="0">
-                <a:solidFill>
-                  <a:srgbClr val="FFFFFF"/>
-                </a:solidFill>
-                <a:latin typeface="Calibri"/>
-              </a:rPr>
-              <a:t>202</a:t>
-            </a:r>
-            <a:r>
-              <a:rPr lang="nb-NO" altLang="en-US" sz="800" b="0" strike="noStrike" spc="-1" dirty="0" smtClean="0">
-                <a:solidFill>
-                  <a:srgbClr val="FFFFFF"/>
-                </a:solidFill>
-                <a:latin typeface="Calibri"/>
-              </a:rPr>
-              <a:t>6</a:t>
-            </a:r>
-            <a:endParaRPr lang="nb-NO" altLang="en-US" sz="800" b="0" strike="noStrike" spc="-1" dirty="0" smtClean="0">
-              <a:solidFill>
-                <a:srgbClr val="FFFFFF"/>
-              </a:solidFill>
-              <a:latin typeface="Calibri"/>
-            </a:endParaRPr>
-          </a:p>
-        </p:txBody>
       </p:sp>
       <p:sp>
         <p:nvSpPr>

</xml_diff>